<commit_message>
Alteração no PPT e nos exemplos.
</commit_message>
<xml_diff>
--- a/Docs/ApresentacaoNHibernateAvancado.pptx
+++ b/Docs/ApresentacaoNHibernateAvancado.pptx
@@ -5,7 +5,7 @@
     <p:sldMasterId id="2147483658" r:id="rId1"/>
   </p:sldMasterIdLst>
   <p:notesMasterIdLst>
-    <p:notesMasterId r:id="rId15"/>
+    <p:notesMasterId r:id="rId16"/>
   </p:notesMasterIdLst>
   <p:sldIdLst>
     <p:sldId id="256" r:id="rId2"/>
@@ -18,31 +18,32 @@
     <p:sldId id="310" r:id="rId9"/>
     <p:sldId id="311" r:id="rId10"/>
     <p:sldId id="312" r:id="rId11"/>
-    <p:sldId id="313" r:id="rId12"/>
-    <p:sldId id="314" r:id="rId13"/>
-    <p:sldId id="315" r:id="rId14"/>
+    <p:sldId id="317" r:id="rId12"/>
+    <p:sldId id="313" r:id="rId13"/>
+    <p:sldId id="314" r:id="rId14"/>
+    <p:sldId id="315" r:id="rId15"/>
   </p:sldIdLst>
   <p:sldSz cx="9144000" cy="5143500" type="screen16x9"/>
   <p:notesSz cx="6858000" cy="9144000"/>
   <p:embeddedFontLst>
     <p:embeddedFont>
       <p:font typeface="Calibri" panose="020F0502020204030204" pitchFamily="34" charset="0"/>
-      <p:regular r:id="rId16"/>
-      <p:bold r:id="rId17"/>
-      <p:italic r:id="rId18"/>
-      <p:boldItalic r:id="rId19"/>
+      <p:regular r:id="rId17"/>
+      <p:bold r:id="rId18"/>
+      <p:italic r:id="rId19"/>
+      <p:boldItalic r:id="rId20"/>
     </p:embeddedFont>
     <p:embeddedFont>
       <p:font typeface="Calibri Light" panose="020F0302020204030204" pitchFamily="34" charset="0"/>
-      <p:regular r:id="rId20"/>
-      <p:italic r:id="rId21"/>
+      <p:regular r:id="rId21"/>
+      <p:italic r:id="rId22"/>
     </p:embeddedFont>
     <p:embeddedFont>
       <p:font typeface="Muli" panose="020B0604020202020204" charset="0"/>
-      <p:regular r:id="rId22"/>
-      <p:bold r:id="rId23"/>
-      <p:italic r:id="rId24"/>
-      <p:boldItalic r:id="rId25"/>
+      <p:regular r:id="rId23"/>
+      <p:bold r:id="rId24"/>
+      <p:italic r:id="rId25"/>
+      <p:boldItalic r:id="rId26"/>
     </p:embeddedFont>
   </p:embeddedFontLst>
   <p:defaultTextStyle>
@@ -1556,7 +1557,7 @@
           <a:p>
             <a:fld id="{4BDF68E2-58F2-4D09-BE8B-E3BD06533059}" type="datetimeFigureOut">
               <a:rPr lang="en-US" dirty="0"/>
-              <a:t>3/23/2019</a:t>
+              <a:t>3/25/2019</a:t>
             </a:fld>
             <a:endParaRPr lang="en-US" dirty="0"/>
           </a:p>
@@ -1774,7 +1775,7 @@
           <a:p>
             <a:fld id="{2E2D6473-DF6D-4702-B328-E0DD40540A4E}" type="datetimeFigureOut">
               <a:rPr lang="en-US" dirty="0"/>
-              <a:t>3/23/2019</a:t>
+              <a:t>3/25/2019</a:t>
             </a:fld>
             <a:endParaRPr lang="en-US" dirty="0"/>
           </a:p>
@@ -2040,7 +2041,7 @@
           <a:p>
             <a:fld id="{E26F7E3A-B166-407D-9866-32884E7D5B37}" type="datetimeFigureOut">
               <a:rPr lang="en-US" dirty="0"/>
-              <a:t>3/23/2019</a:t>
+              <a:t>3/25/2019</a:t>
             </a:fld>
             <a:endParaRPr lang="en-US" dirty="0"/>
           </a:p>
@@ -3082,7 +3083,7 @@
           <a:p>
             <a:fld id="{528FC5F6-F338-4AE4-BB23-26385BCFC423}" type="datetimeFigureOut">
               <a:rPr lang="en-US" dirty="0"/>
-              <a:t>3/23/2019</a:t>
+              <a:t>3/25/2019</a:t>
             </a:fld>
             <a:endParaRPr lang="en-US" dirty="0"/>
           </a:p>
@@ -3435,7 +3436,7 @@
           <a:p>
             <a:fld id="{20EBB0C4-6273-4C6E-B9BD-2EDC30F1CD52}" type="datetimeFigureOut">
               <a:rPr lang="en-US" dirty="0"/>
-              <a:t>3/23/2019</a:t>
+              <a:t>3/25/2019</a:t>
             </a:fld>
             <a:endParaRPr lang="en-US" dirty="0"/>
           </a:p>
@@ -3720,7 +3721,7 @@
           <a:p>
             <a:fld id="{19AB4D41-86C1-4908-B66A-0B50CEB3BF29}" type="datetimeFigureOut">
               <a:rPr lang="en-US" dirty="0"/>
-              <a:t>3/23/2019</a:t>
+              <a:t>3/25/2019</a:t>
             </a:fld>
             <a:endParaRPr lang="en-US" dirty="0"/>
           </a:p>
@@ -4109,7 +4110,7 @@
           <a:p>
             <a:fld id="{E6426E2C-56C1-4E0D-A793-0088A7FDD37E}" type="datetimeFigureOut">
               <a:rPr lang="en-US" dirty="0"/>
-              <a:t>3/23/2019</a:t>
+              <a:t>3/25/2019</a:t>
             </a:fld>
             <a:endParaRPr lang="en-US" dirty="0"/>
           </a:p>
@@ -4237,7 +4238,7 @@
           <a:p>
             <a:fld id="{C8C39B41-D8B5-4052-B551-9B5525EAA8B6}" type="datetimeFigureOut">
               <a:rPr lang="en-US" dirty="0"/>
-              <a:t>3/23/2019</a:t>
+              <a:t>3/25/2019</a:t>
             </a:fld>
             <a:endParaRPr lang="en-US" dirty="0"/>
           </a:p>
@@ -4418,7 +4419,7 @@
           <a:p>
             <a:fld id="{4D94136C-8742-45B2-AF27-D93DF72833A9}" type="datetimeFigureOut">
               <a:rPr lang="en-US" dirty="0"/>
-              <a:t>3/23/2019</a:t>
+              <a:t>3/25/2019</a:t>
             </a:fld>
             <a:endParaRPr lang="en-US" dirty="0"/>
           </a:p>
@@ -4782,7 +4783,7 @@
           <a:p>
             <a:fld id="{32ABBEA6-7C60-4B02-AE87-00D78D8422AF}" type="datetimeFigureOut">
               <a:rPr lang="en-US" dirty="0"/>
-              <a:t>3/23/2019</a:t>
+              <a:t>3/25/2019</a:t>
             </a:fld>
             <a:endParaRPr lang="en-US" dirty="0"/>
           </a:p>
@@ -5174,7 +5175,7 @@
           <a:p>
             <a:fld id="{C9CAD897-D46E-4AD2-BD9B-49DD3E640873}" type="datetimeFigureOut">
               <a:rPr lang="en-US" dirty="0"/>
-              <a:t>3/23/2019</a:t>
+              <a:t>3/25/2019</a:t>
             </a:fld>
             <a:endParaRPr lang="en-US" dirty="0"/>
           </a:p>
@@ -5471,7 +5472,7 @@
           <a:p>
             <a:fld id="{98624D31-43A5-475A-80CF-332C9F6DCF35}" type="datetimeFigureOut">
               <a:rPr lang="en-US" dirty="0"/>
-              <a:t>3/23/2019</a:t>
+              <a:t>3/25/2019</a:t>
             </a:fld>
             <a:endParaRPr lang="en-US" dirty="0"/>
           </a:p>
@@ -6111,50 +6112,412 @@
       </p:sp>
       <p:sp>
         <p:nvSpPr>
-          <p:cNvPr id="3" name="CaixaDeTexto 2">
+          <p:cNvPr id="4" name="Elipse 3">
             <a:extLst>
               <a:ext uri="{FF2B5EF4-FFF2-40B4-BE49-F238E27FC236}">
-                <a16:creationId xmlns:a16="http://schemas.microsoft.com/office/drawing/2014/main" id="{0AAC596E-D1DB-469D-ABAD-A7B1178C02A3}"/>
+                <a16:creationId xmlns:a16="http://schemas.microsoft.com/office/drawing/2014/main" id="{3321DF40-2ADB-482E-8A72-B5B41E7109D5}"/>
               </a:ext>
             </a:extLst>
           </p:cNvPr>
-          <p:cNvSpPr txBox="1"/>
+          <p:cNvSpPr/>
           <p:nvPr/>
         </p:nvSpPr>
         <p:spPr>
           <a:xfrm>
-            <a:off x="2717800" y="1778000"/>
-            <a:ext cx="1776127" cy="646331"/>
+            <a:off x="1397204" y="1901951"/>
+            <a:ext cx="1367942" cy="738835"/>
+          </a:xfrm>
+          <a:prstGeom prst="ellipse">
+            <a:avLst/>
+          </a:prstGeom>
+        </p:spPr>
+        <p:style>
+          <a:lnRef idx="2">
+            <a:schemeClr val="accent2">
+              <a:shade val="50000"/>
+            </a:schemeClr>
+          </a:lnRef>
+          <a:fillRef idx="1">
+            <a:schemeClr val="accent2"/>
+          </a:fillRef>
+          <a:effectRef idx="0">
+            <a:schemeClr val="accent2"/>
+          </a:effectRef>
+          <a:fontRef idx="minor">
+            <a:schemeClr val="lt1"/>
+          </a:fontRef>
+        </p:style>
+        <p:txBody>
+          <a:bodyPr rtlCol="0" anchor="ctr"/>
+          <a:lstStyle/>
+          <a:p>
+            <a:pPr algn="ctr"/>
+            <a:r>
+              <a:rPr lang="en-US" dirty="0" err="1"/>
+              <a:t>ISession</a:t>
+            </a:r>
+            <a:endParaRPr lang="en-US" dirty="0"/>
+          </a:p>
+        </p:txBody>
+      </p:sp>
+      <p:sp>
+        <p:nvSpPr>
+          <p:cNvPr id="5" name="Seta: para a Direita 4">
+            <a:extLst>
+              <a:ext uri="{FF2B5EF4-FFF2-40B4-BE49-F238E27FC236}">
+                <a16:creationId xmlns:a16="http://schemas.microsoft.com/office/drawing/2014/main" id="{720591AF-823F-4496-BDCD-E72E86D7E754}"/>
+              </a:ext>
+            </a:extLst>
+          </p:cNvPr>
+          <p:cNvSpPr/>
+          <p:nvPr/>
+        </p:nvSpPr>
+        <p:spPr>
+          <a:xfrm>
+            <a:off x="2882188" y="2220162"/>
+            <a:ext cx="3496668" cy="102412"/>
+          </a:xfrm>
+          <a:prstGeom prst="rightArrow">
+            <a:avLst/>
+          </a:prstGeom>
+        </p:spPr>
+        <p:style>
+          <a:lnRef idx="2">
+            <a:schemeClr val="accent1">
+              <a:shade val="50000"/>
+            </a:schemeClr>
+          </a:lnRef>
+          <a:fillRef idx="1">
+            <a:schemeClr val="accent1"/>
+          </a:fillRef>
+          <a:effectRef idx="0">
+            <a:schemeClr val="accent1"/>
+          </a:effectRef>
+          <a:fontRef idx="minor">
+            <a:schemeClr val="lt1"/>
+          </a:fontRef>
+        </p:style>
+        <p:txBody>
+          <a:bodyPr rtlCol="0" anchor="ctr"/>
+          <a:lstStyle/>
+          <a:p>
+            <a:pPr algn="ctr"/>
+            <a:endParaRPr lang="en-US"/>
+          </a:p>
+        </p:txBody>
+      </p:sp>
+      <p:sp>
+        <p:nvSpPr>
+          <p:cNvPr id="6" name="Seta: para a Direita 5">
+            <a:extLst>
+              <a:ext uri="{FF2B5EF4-FFF2-40B4-BE49-F238E27FC236}">
+                <a16:creationId xmlns:a16="http://schemas.microsoft.com/office/drawing/2014/main" id="{9C953236-DF8F-418B-AA99-53E208AEEF57}"/>
+              </a:ext>
+            </a:extLst>
+          </p:cNvPr>
+          <p:cNvSpPr/>
+          <p:nvPr/>
+        </p:nvSpPr>
+        <p:spPr>
+          <a:xfrm rot="7088426">
+            <a:off x="953186" y="3037414"/>
+            <a:ext cx="888036" cy="88087"/>
+          </a:xfrm>
+          <a:prstGeom prst="rightArrow">
+            <a:avLst/>
+          </a:prstGeom>
+        </p:spPr>
+        <p:style>
+          <a:lnRef idx="2">
+            <a:schemeClr val="accent1">
+              <a:shade val="50000"/>
+            </a:schemeClr>
+          </a:lnRef>
+          <a:fillRef idx="1">
+            <a:schemeClr val="accent1"/>
+          </a:fillRef>
+          <a:effectRef idx="0">
+            <a:schemeClr val="accent1"/>
+          </a:effectRef>
+          <a:fontRef idx="minor">
+            <a:schemeClr val="lt1"/>
+          </a:fontRef>
+        </p:style>
+        <p:txBody>
+          <a:bodyPr rtlCol="0" anchor="ctr"/>
+          <a:lstStyle/>
+          <a:p>
+            <a:pPr algn="ctr"/>
+            <a:endParaRPr lang="en-US"/>
+          </a:p>
+        </p:txBody>
+      </p:sp>
+      <p:pic>
+        <p:nvPicPr>
+          <p:cNvPr id="7" name="Imagem 6">
+            <a:extLst>
+              <a:ext uri="{FF2B5EF4-FFF2-40B4-BE49-F238E27FC236}">
+                <a16:creationId xmlns:a16="http://schemas.microsoft.com/office/drawing/2014/main" id="{B7EE1642-8365-4D99-B55D-3319D5809C6E}"/>
+              </a:ext>
+            </a:extLst>
+          </p:cNvPr>
+          <p:cNvPicPr>
+            <a:picLocks noChangeAspect="1"/>
+          </p:cNvPicPr>
+          <p:nvPr/>
+        </p:nvPicPr>
+        <p:blipFill>
+          <a:blip r:embed="rId2"/>
+          <a:stretch>
+            <a:fillRect/>
+          </a:stretch>
+        </p:blipFill>
+        <p:spPr>
+          <a:xfrm>
+            <a:off x="6495898" y="1745499"/>
+            <a:ext cx="785648" cy="949325"/>
           </a:xfrm>
           <a:prstGeom prst="rect">
             <a:avLst/>
           </a:prstGeom>
-          <a:noFill/>
         </p:spPr>
+      </p:pic>
+      <p:sp>
+        <p:nvSpPr>
+          <p:cNvPr id="8" name="Elipse 7">
+            <a:extLst>
+              <a:ext uri="{FF2B5EF4-FFF2-40B4-BE49-F238E27FC236}">
+                <a16:creationId xmlns:a16="http://schemas.microsoft.com/office/drawing/2014/main" id="{4137FA73-B825-43B7-B4F2-C30727CDA7A3}"/>
+              </a:ext>
+            </a:extLst>
+          </p:cNvPr>
+          <p:cNvSpPr/>
+          <p:nvPr/>
+        </p:nvSpPr>
+        <p:spPr>
+          <a:xfrm>
+            <a:off x="426576" y="3595419"/>
+            <a:ext cx="1051560" cy="490121"/>
+          </a:xfrm>
+          <a:prstGeom prst="ellipse">
+            <a:avLst/>
+          </a:prstGeom>
+        </p:spPr>
+        <p:style>
+          <a:lnRef idx="2">
+            <a:schemeClr val="accent2">
+              <a:shade val="50000"/>
+            </a:schemeClr>
+          </a:lnRef>
+          <a:fillRef idx="1">
+            <a:schemeClr val="accent2"/>
+          </a:fillRef>
+          <a:effectRef idx="0">
+            <a:schemeClr val="accent2"/>
+          </a:effectRef>
+          <a:fontRef idx="minor">
+            <a:schemeClr val="lt1"/>
+          </a:fontRef>
+        </p:style>
         <p:txBody>
-          <a:bodyPr wrap="none" rtlCol="0">
-            <a:spAutoFit/>
-          </a:bodyPr>
+          <a:bodyPr rtlCol="0" anchor="ctr"/>
           <a:lstStyle/>
           <a:p>
-            <a:pPr marL="285750" indent="-285750">
-              <a:buFont typeface="Arial" panose="020B0604020202020204" pitchFamily="34" charset="0"/>
-              <a:buChar char="•"/>
-            </a:pPr>
+            <a:pPr algn="ctr"/>
             <a:r>
               <a:rPr lang="en-US" dirty="0"/>
-              <a:t>Events Source</a:t>
-            </a:r>
-          </a:p>
-          <a:p>
-            <a:pPr marL="285750" indent="-285750">
-              <a:buFont typeface="Arial" panose="020B0604020202020204" pitchFamily="34" charset="0"/>
-              <a:buChar char="•"/>
-            </a:pPr>
+              <a:t>Event</a:t>
+            </a:r>
+          </a:p>
+        </p:txBody>
+      </p:sp>
+      <p:sp>
+        <p:nvSpPr>
+          <p:cNvPr id="9" name="Elipse 8">
+            <a:extLst>
+              <a:ext uri="{FF2B5EF4-FFF2-40B4-BE49-F238E27FC236}">
+                <a16:creationId xmlns:a16="http://schemas.microsoft.com/office/drawing/2014/main" id="{66444E05-BBEF-4925-BD0B-E079C5CEA440}"/>
+              </a:ext>
+            </a:extLst>
+          </p:cNvPr>
+          <p:cNvSpPr/>
+          <p:nvPr/>
+        </p:nvSpPr>
+        <p:spPr>
+          <a:xfrm>
+            <a:off x="2407776" y="3674667"/>
+            <a:ext cx="1051560" cy="490121"/>
+          </a:xfrm>
+          <a:prstGeom prst="ellipse">
+            <a:avLst/>
+          </a:prstGeom>
+        </p:spPr>
+        <p:style>
+          <a:lnRef idx="2">
+            <a:schemeClr val="accent2">
+              <a:shade val="50000"/>
+            </a:schemeClr>
+          </a:lnRef>
+          <a:fillRef idx="1">
+            <a:schemeClr val="accent2"/>
+          </a:fillRef>
+          <a:effectRef idx="0">
+            <a:schemeClr val="accent2"/>
+          </a:effectRef>
+          <a:fontRef idx="minor">
+            <a:schemeClr val="lt1"/>
+          </a:fontRef>
+        </p:style>
+        <p:txBody>
+          <a:bodyPr rtlCol="0" anchor="ctr"/>
+          <a:lstStyle/>
+          <a:p>
+            <a:pPr algn="ctr"/>
             <a:r>
               <a:rPr lang="en-US" dirty="0"/>
-              <a:t>Auditoria</a:t>
-            </a:r>
+              <a:t>Event</a:t>
+            </a:r>
+          </a:p>
+        </p:txBody>
+      </p:sp>
+      <p:sp>
+        <p:nvSpPr>
+          <p:cNvPr id="10" name="Elipse 9">
+            <a:extLst>
+              <a:ext uri="{FF2B5EF4-FFF2-40B4-BE49-F238E27FC236}">
+                <a16:creationId xmlns:a16="http://schemas.microsoft.com/office/drawing/2014/main" id="{F52524F3-5561-423D-AE38-12930202D5DC}"/>
+              </a:ext>
+            </a:extLst>
+          </p:cNvPr>
+          <p:cNvSpPr/>
+          <p:nvPr/>
+        </p:nvSpPr>
+        <p:spPr>
+          <a:xfrm>
+            <a:off x="3987859" y="3248702"/>
+            <a:ext cx="1051560" cy="490121"/>
+          </a:xfrm>
+          <a:prstGeom prst="ellipse">
+            <a:avLst/>
+          </a:prstGeom>
+        </p:spPr>
+        <p:style>
+          <a:lnRef idx="2">
+            <a:schemeClr val="accent2">
+              <a:shade val="50000"/>
+            </a:schemeClr>
+          </a:lnRef>
+          <a:fillRef idx="1">
+            <a:schemeClr val="accent2"/>
+          </a:fillRef>
+          <a:effectRef idx="0">
+            <a:schemeClr val="accent2"/>
+          </a:effectRef>
+          <a:fontRef idx="minor">
+            <a:schemeClr val="lt1"/>
+          </a:fontRef>
+        </p:style>
+        <p:txBody>
+          <a:bodyPr rtlCol="0" anchor="ctr"/>
+          <a:lstStyle/>
+          <a:p>
+            <a:pPr algn="ctr"/>
+            <a:r>
+              <a:rPr lang="en-US" dirty="0"/>
+              <a:t>Event</a:t>
+            </a:r>
+          </a:p>
+        </p:txBody>
+      </p:sp>
+      <p:sp>
+        <p:nvSpPr>
+          <p:cNvPr id="11" name="Seta: para a Direita 10">
+            <a:extLst>
+              <a:ext uri="{FF2B5EF4-FFF2-40B4-BE49-F238E27FC236}">
+                <a16:creationId xmlns:a16="http://schemas.microsoft.com/office/drawing/2014/main" id="{CD49715F-4F53-42F5-ACB2-F5F6847FE28A}"/>
+              </a:ext>
+            </a:extLst>
+          </p:cNvPr>
+          <p:cNvSpPr/>
+          <p:nvPr/>
+        </p:nvSpPr>
+        <p:spPr>
+          <a:xfrm rot="4422151">
+            <a:off x="2204084" y="3088093"/>
+            <a:ext cx="888036" cy="88087"/>
+          </a:xfrm>
+          <a:prstGeom prst="rightArrow">
+            <a:avLst/>
+          </a:prstGeom>
+        </p:spPr>
+        <p:style>
+          <a:lnRef idx="2">
+            <a:schemeClr val="accent1">
+              <a:shade val="50000"/>
+            </a:schemeClr>
+          </a:lnRef>
+          <a:fillRef idx="1">
+            <a:schemeClr val="accent1"/>
+          </a:fillRef>
+          <a:effectRef idx="0">
+            <a:schemeClr val="accent1"/>
+          </a:effectRef>
+          <a:fontRef idx="minor">
+            <a:schemeClr val="lt1"/>
+          </a:fontRef>
+        </p:style>
+        <p:txBody>
+          <a:bodyPr rtlCol="0" anchor="ctr"/>
+          <a:lstStyle/>
+          <a:p>
+            <a:pPr algn="ctr"/>
+            <a:endParaRPr lang="en-US"/>
+          </a:p>
+        </p:txBody>
+      </p:sp>
+      <p:sp>
+        <p:nvSpPr>
+          <p:cNvPr id="12" name="Seta: para a Direita 11">
+            <a:extLst>
+              <a:ext uri="{FF2B5EF4-FFF2-40B4-BE49-F238E27FC236}">
+                <a16:creationId xmlns:a16="http://schemas.microsoft.com/office/drawing/2014/main" id="{B9905D53-AD28-49D4-B832-64D40E91D9F4}"/>
+              </a:ext>
+            </a:extLst>
+          </p:cNvPr>
+          <p:cNvSpPr/>
+          <p:nvPr/>
+        </p:nvSpPr>
+        <p:spPr>
+          <a:xfrm rot="2027239">
+            <a:off x="2725910" y="2905520"/>
+            <a:ext cx="1349065" cy="82813"/>
+          </a:xfrm>
+          <a:prstGeom prst="rightArrow">
+            <a:avLst/>
+          </a:prstGeom>
+        </p:spPr>
+        <p:style>
+          <a:lnRef idx="2">
+            <a:schemeClr val="accent1">
+              <a:shade val="50000"/>
+            </a:schemeClr>
+          </a:lnRef>
+          <a:fillRef idx="1">
+            <a:schemeClr val="accent1"/>
+          </a:fillRef>
+          <a:effectRef idx="0">
+            <a:schemeClr val="accent1"/>
+          </a:effectRef>
+          <a:fontRef idx="minor">
+            <a:schemeClr val="lt1"/>
+          </a:fontRef>
+        </p:style>
+        <p:txBody>
+          <a:bodyPr rtlCol="0" anchor="ctr"/>
+          <a:lstStyle/>
+          <a:p>
+            <a:pPr algn="ctr"/>
+            <a:endParaRPr lang="en-US"/>
           </a:p>
         </p:txBody>
       </p:sp>
@@ -6190,6 +6553,394 @@
       </p:grpSpPr>
       <p:sp>
         <p:nvSpPr>
+          <p:cNvPr id="3" name="CaixaDeTexto 2">
+            <a:extLst>
+              <a:ext uri="{FF2B5EF4-FFF2-40B4-BE49-F238E27FC236}">
+                <a16:creationId xmlns:a16="http://schemas.microsoft.com/office/drawing/2014/main" id="{534CB251-6899-4208-B60B-12E87BCBDC24}"/>
+              </a:ext>
+            </a:extLst>
+          </p:cNvPr>
+          <p:cNvSpPr txBox="1"/>
+          <p:nvPr/>
+        </p:nvSpPr>
+        <p:spPr>
+          <a:xfrm>
+            <a:off x="1177128" y="1304523"/>
+            <a:ext cx="7181261" cy="2554545"/>
+          </a:xfrm>
+          <a:prstGeom prst="rect">
+            <a:avLst/>
+          </a:prstGeom>
+          <a:noFill/>
+        </p:spPr>
+        <p:txBody>
+          <a:bodyPr wrap="square" rtlCol="0">
+            <a:spAutoFit/>
+          </a:bodyPr>
+          <a:lstStyle/>
+          <a:p>
+            <a:pPr marL="285750" indent="-285750">
+              <a:buFont typeface="Arial" panose="020B0604020202020204" pitchFamily="34" charset="0"/>
+              <a:buChar char="•"/>
+            </a:pPr>
+            <a:r>
+              <a:rPr lang="pt-BR" sz="2000" spc="-38" dirty="0" err="1">
+                <a:solidFill>
+                  <a:schemeClr val="tx1">
+                    <a:lumMod val="75000"/>
+                    <a:lumOff val="25000"/>
+                  </a:schemeClr>
+                </a:solidFill>
+                <a:latin typeface="+mj-lt"/>
+                <a:ea typeface="+mj-ea"/>
+                <a:cs typeface="+mj-cs"/>
+              </a:rPr>
+              <a:t>IPreLoadEventListener</a:t>
+            </a:r>
+            <a:r>
+              <a:rPr lang="pt-BR" sz="2000" spc="-38" dirty="0">
+                <a:solidFill>
+                  <a:schemeClr val="tx1">
+                    <a:lumMod val="75000"/>
+                    <a:lumOff val="25000"/>
+                  </a:schemeClr>
+                </a:solidFill>
+                <a:latin typeface="+mj-lt"/>
+                <a:ea typeface="+mj-ea"/>
+                <a:cs typeface="+mj-cs"/>
+              </a:rPr>
+              <a:t> - Antes de carregar um novo objeto.</a:t>
+            </a:r>
+          </a:p>
+          <a:p>
+            <a:pPr marL="285750" indent="-285750">
+              <a:buFont typeface="Arial" panose="020B0604020202020204" pitchFamily="34" charset="0"/>
+              <a:buChar char="•"/>
+            </a:pPr>
+            <a:r>
+              <a:rPr lang="pt-BR" sz="2000" spc="-38" dirty="0" err="1">
+                <a:solidFill>
+                  <a:schemeClr val="tx1">
+                    <a:lumMod val="75000"/>
+                    <a:lumOff val="25000"/>
+                  </a:schemeClr>
+                </a:solidFill>
+                <a:latin typeface="+mj-lt"/>
+                <a:ea typeface="+mj-ea"/>
+                <a:cs typeface="+mj-cs"/>
+              </a:rPr>
+              <a:t>IPreUpdateEventListener</a:t>
+            </a:r>
+            <a:r>
+              <a:rPr lang="pt-BR" sz="2000" spc="-38" dirty="0">
+                <a:solidFill>
+                  <a:schemeClr val="tx1">
+                    <a:lumMod val="75000"/>
+                    <a:lumOff val="25000"/>
+                  </a:schemeClr>
+                </a:solidFill>
+                <a:latin typeface="+mj-lt"/>
+                <a:ea typeface="+mj-ea"/>
+                <a:cs typeface="+mj-cs"/>
+              </a:rPr>
+              <a:t> - Antes de atualizar um objeto no banco.</a:t>
+            </a:r>
+          </a:p>
+          <a:p>
+            <a:pPr marL="285750" indent="-285750">
+              <a:buFont typeface="Arial" panose="020B0604020202020204" pitchFamily="34" charset="0"/>
+              <a:buChar char="•"/>
+            </a:pPr>
+            <a:r>
+              <a:rPr lang="pt-BR" sz="2000" spc="-38" dirty="0" err="1">
+                <a:solidFill>
+                  <a:schemeClr val="tx1">
+                    <a:lumMod val="75000"/>
+                    <a:lumOff val="25000"/>
+                  </a:schemeClr>
+                </a:solidFill>
+                <a:latin typeface="+mj-lt"/>
+                <a:ea typeface="+mj-ea"/>
+                <a:cs typeface="+mj-cs"/>
+              </a:rPr>
+              <a:t>IPreDeleteEventListener</a:t>
+            </a:r>
+            <a:r>
+              <a:rPr lang="pt-BR" sz="2000" spc="-38" dirty="0">
+                <a:solidFill>
+                  <a:schemeClr val="tx1">
+                    <a:lumMod val="75000"/>
+                    <a:lumOff val="25000"/>
+                  </a:schemeClr>
+                </a:solidFill>
+                <a:latin typeface="+mj-lt"/>
+                <a:ea typeface="+mj-ea"/>
+                <a:cs typeface="+mj-cs"/>
+              </a:rPr>
+              <a:t> - Antes de deletar um objeto no banco.</a:t>
+            </a:r>
+          </a:p>
+          <a:p>
+            <a:pPr marL="285750" indent="-285750">
+              <a:buFont typeface="Arial" panose="020B0604020202020204" pitchFamily="34" charset="0"/>
+              <a:buChar char="•"/>
+            </a:pPr>
+            <a:r>
+              <a:rPr lang="pt-BR" sz="2000" spc="-38" dirty="0" err="1">
+                <a:solidFill>
+                  <a:schemeClr val="tx1">
+                    <a:lumMod val="75000"/>
+                    <a:lumOff val="25000"/>
+                  </a:schemeClr>
+                </a:solidFill>
+                <a:latin typeface="+mj-lt"/>
+                <a:ea typeface="+mj-ea"/>
+                <a:cs typeface="+mj-cs"/>
+              </a:rPr>
+              <a:t>IPreInsertEventListener</a:t>
+            </a:r>
+            <a:r>
+              <a:rPr lang="pt-BR" sz="2000" spc="-38" dirty="0">
+                <a:solidFill>
+                  <a:schemeClr val="tx1">
+                    <a:lumMod val="75000"/>
+                    <a:lumOff val="25000"/>
+                  </a:schemeClr>
+                </a:solidFill>
+                <a:latin typeface="+mj-lt"/>
+                <a:ea typeface="+mj-ea"/>
+                <a:cs typeface="+mj-cs"/>
+              </a:rPr>
+              <a:t> - Antes de inserir um objeto no banco.</a:t>
+            </a:r>
+          </a:p>
+          <a:p>
+            <a:pPr marL="285750" indent="-285750">
+              <a:buFont typeface="Arial" panose="020B0604020202020204" pitchFamily="34" charset="0"/>
+              <a:buChar char="•"/>
+            </a:pPr>
+            <a:r>
+              <a:rPr lang="pt-BR" sz="2000" spc="-38" dirty="0" err="1">
+                <a:solidFill>
+                  <a:schemeClr val="tx1">
+                    <a:lumMod val="75000"/>
+                    <a:lumOff val="25000"/>
+                  </a:schemeClr>
+                </a:solidFill>
+                <a:latin typeface="+mj-lt"/>
+                <a:ea typeface="+mj-ea"/>
+                <a:cs typeface="+mj-cs"/>
+              </a:rPr>
+              <a:t>IPostLoadEventListener</a:t>
+            </a:r>
+            <a:r>
+              <a:rPr lang="pt-BR" sz="2000" spc="-38" dirty="0">
+                <a:solidFill>
+                  <a:schemeClr val="tx1">
+                    <a:lumMod val="75000"/>
+                    <a:lumOff val="25000"/>
+                  </a:schemeClr>
+                </a:solidFill>
+                <a:latin typeface="+mj-lt"/>
+                <a:ea typeface="+mj-ea"/>
+                <a:cs typeface="+mj-cs"/>
+              </a:rPr>
+              <a:t> - Após carregar um novo objeto.</a:t>
+            </a:r>
+          </a:p>
+          <a:p>
+            <a:pPr marL="285750" indent="-285750">
+              <a:buFont typeface="Arial" panose="020B0604020202020204" pitchFamily="34" charset="0"/>
+              <a:buChar char="•"/>
+            </a:pPr>
+            <a:r>
+              <a:rPr lang="pt-BR" sz="2000" spc="-38" dirty="0" err="1">
+                <a:solidFill>
+                  <a:schemeClr val="tx1">
+                    <a:lumMod val="75000"/>
+                    <a:lumOff val="25000"/>
+                  </a:schemeClr>
+                </a:solidFill>
+                <a:latin typeface="+mj-lt"/>
+                <a:ea typeface="+mj-ea"/>
+                <a:cs typeface="+mj-cs"/>
+              </a:rPr>
+              <a:t>IPostUpdateEventListener</a:t>
+            </a:r>
+            <a:r>
+              <a:rPr lang="pt-BR" sz="2000" spc="-38" dirty="0">
+                <a:solidFill>
+                  <a:schemeClr val="tx1">
+                    <a:lumMod val="75000"/>
+                    <a:lumOff val="25000"/>
+                  </a:schemeClr>
+                </a:solidFill>
+                <a:latin typeface="+mj-lt"/>
+                <a:ea typeface="+mj-ea"/>
+                <a:cs typeface="+mj-cs"/>
+              </a:rPr>
+              <a:t> - Após atualizar um objeto no banco.</a:t>
+            </a:r>
+          </a:p>
+          <a:p>
+            <a:pPr marL="285750" indent="-285750">
+              <a:buFont typeface="Arial" panose="020B0604020202020204" pitchFamily="34" charset="0"/>
+              <a:buChar char="•"/>
+            </a:pPr>
+            <a:r>
+              <a:rPr lang="pt-BR" sz="2000" spc="-38" dirty="0" err="1">
+                <a:solidFill>
+                  <a:schemeClr val="tx1">
+                    <a:lumMod val="75000"/>
+                    <a:lumOff val="25000"/>
+                  </a:schemeClr>
+                </a:solidFill>
+                <a:latin typeface="+mj-lt"/>
+                <a:ea typeface="+mj-ea"/>
+                <a:cs typeface="+mj-cs"/>
+              </a:rPr>
+              <a:t>IPostDeleteEventListener</a:t>
+            </a:r>
+            <a:r>
+              <a:rPr lang="pt-BR" sz="2000" spc="-38" dirty="0">
+                <a:solidFill>
+                  <a:schemeClr val="tx1">
+                    <a:lumMod val="75000"/>
+                    <a:lumOff val="25000"/>
+                  </a:schemeClr>
+                </a:solidFill>
+                <a:latin typeface="+mj-lt"/>
+                <a:ea typeface="+mj-ea"/>
+                <a:cs typeface="+mj-cs"/>
+              </a:rPr>
+              <a:t> - Após deletar um objeto no banco.</a:t>
+            </a:r>
+          </a:p>
+          <a:p>
+            <a:pPr marL="285750" indent="-285750">
+              <a:buFont typeface="Arial" panose="020B0604020202020204" pitchFamily="34" charset="0"/>
+              <a:buChar char="•"/>
+            </a:pPr>
+            <a:r>
+              <a:rPr lang="pt-BR" sz="2000" spc="-38" dirty="0" err="1">
+                <a:solidFill>
+                  <a:schemeClr val="tx1">
+                    <a:lumMod val="75000"/>
+                    <a:lumOff val="25000"/>
+                  </a:schemeClr>
+                </a:solidFill>
+                <a:latin typeface="+mj-lt"/>
+                <a:ea typeface="+mj-ea"/>
+                <a:cs typeface="+mj-cs"/>
+              </a:rPr>
+              <a:t>IPostInsertEventListener</a:t>
+            </a:r>
+            <a:r>
+              <a:rPr lang="pt-BR" sz="2000" spc="-38" dirty="0">
+                <a:solidFill>
+                  <a:schemeClr val="tx1">
+                    <a:lumMod val="75000"/>
+                    <a:lumOff val="25000"/>
+                  </a:schemeClr>
+                </a:solidFill>
+                <a:latin typeface="+mj-lt"/>
+                <a:ea typeface="+mj-ea"/>
+                <a:cs typeface="+mj-cs"/>
+              </a:rPr>
+              <a:t> - Após inserir um objeto no banco.</a:t>
+            </a:r>
+            <a:endParaRPr lang="en-US" dirty="0"/>
+          </a:p>
+        </p:txBody>
+      </p:sp>
+      <p:sp>
+        <p:nvSpPr>
+          <p:cNvPr id="4" name="CaixaDeTexto 3">
+            <a:extLst>
+              <a:ext uri="{FF2B5EF4-FFF2-40B4-BE49-F238E27FC236}">
+                <a16:creationId xmlns:a16="http://schemas.microsoft.com/office/drawing/2014/main" id="{606E74E4-F336-4268-891C-59889E7EDF17}"/>
+              </a:ext>
+            </a:extLst>
+          </p:cNvPr>
+          <p:cNvSpPr txBox="1"/>
+          <p:nvPr/>
+        </p:nvSpPr>
+        <p:spPr>
+          <a:xfrm>
+            <a:off x="3290552" y="457200"/>
+            <a:ext cx="1907830" cy="646331"/>
+          </a:xfrm>
+          <a:prstGeom prst="rect">
+            <a:avLst/>
+          </a:prstGeom>
+          <a:noFill/>
+        </p:spPr>
+        <p:txBody>
+          <a:bodyPr wrap="none" rtlCol="0">
+            <a:spAutoFit/>
+          </a:bodyPr>
+          <a:lstStyle/>
+          <a:p>
+            <a:r>
+              <a:rPr lang="en-US" sz="3600" spc="-38" dirty="0" err="1">
+                <a:solidFill>
+                  <a:schemeClr val="tx1">
+                    <a:lumMod val="75000"/>
+                    <a:lumOff val="25000"/>
+                  </a:schemeClr>
+                </a:solidFill>
+                <a:latin typeface="+mj-lt"/>
+                <a:ea typeface="+mj-ea"/>
+                <a:cs typeface="+mj-cs"/>
+              </a:rPr>
+              <a:t>Exemplos</a:t>
+            </a:r>
+            <a:endParaRPr lang="en-US" sz="3600" spc="-38" dirty="0">
+              <a:solidFill>
+                <a:schemeClr val="tx1">
+                  <a:lumMod val="75000"/>
+                  <a:lumOff val="25000"/>
+                </a:schemeClr>
+              </a:solidFill>
+              <a:latin typeface="+mj-lt"/>
+              <a:ea typeface="+mj-ea"/>
+              <a:cs typeface="+mj-cs"/>
+            </a:endParaRPr>
+          </a:p>
+        </p:txBody>
+      </p:sp>
+    </p:spTree>
+    <p:extLst>
+      <p:ext uri="{BB962C8B-B14F-4D97-AF65-F5344CB8AC3E}">
+        <p14:creationId xmlns:p14="http://schemas.microsoft.com/office/powerpoint/2010/main" val="1100481253"/>
+      </p:ext>
+    </p:extLst>
+  </p:cSld>
+  <p:clrMapOvr>
+    <a:masterClrMapping/>
+  </p:clrMapOvr>
+</p:sld>
+</file>
+
+<file path=ppt/slides/slide12.xml><?xml version="1.0" encoding="utf-8"?>
+<p:sld xmlns:a="http://schemas.openxmlformats.org/drawingml/2006/main" xmlns:r="http://schemas.openxmlformats.org/officeDocument/2006/relationships" xmlns:p="http://schemas.openxmlformats.org/presentationml/2006/main">
+  <p:cSld>
+    <p:spTree>
+      <p:nvGrpSpPr>
+        <p:cNvPr id="1" name=""/>
+        <p:cNvGrpSpPr/>
+        <p:nvPr/>
+      </p:nvGrpSpPr>
+      <p:grpSpPr>
+        <a:xfrm>
+          <a:off x="0" y="0"/>
+          <a:ext cx="0" cy="0"/>
+          <a:chOff x="0" y="0"/>
+          <a:chExt cx="0" cy="0"/>
+        </a:xfrm>
+      </p:grpSpPr>
+      <p:sp>
+        <p:nvSpPr>
           <p:cNvPr id="2" name="Título 1">
             <a:extLst>
               <a:ext uri="{FF2B5EF4-FFF2-40B4-BE49-F238E27FC236}">
@@ -6218,67 +6969,66 @@
           </a:p>
         </p:txBody>
       </p:sp>
-      <p:sp>
-        <p:nvSpPr>
-          <p:cNvPr id="3" name="CaixaDeTexto 2">
+      <p:pic>
+        <p:nvPicPr>
+          <p:cNvPr id="11" name="Imagem 10">
             <a:extLst>
               <a:ext uri="{FF2B5EF4-FFF2-40B4-BE49-F238E27FC236}">
-                <a16:creationId xmlns:a16="http://schemas.microsoft.com/office/drawing/2014/main" id="{490A83E0-DA54-49F2-9BAD-AC2B3C40097E}"/>
+                <a16:creationId xmlns:a16="http://schemas.microsoft.com/office/drawing/2014/main" id="{FCC6A95B-AD59-48EB-8F15-B81B737B2773}"/>
               </a:ext>
             </a:extLst>
           </p:cNvPr>
-          <p:cNvSpPr txBox="1"/>
+          <p:cNvPicPr>
+            <a:picLocks noChangeAspect="1"/>
+          </p:cNvPicPr>
           <p:nvPr/>
-        </p:nvSpPr>
+        </p:nvPicPr>
+        <p:blipFill>
+          <a:blip r:embed="rId2"/>
+          <a:stretch>
+            <a:fillRect/>
+          </a:stretch>
+        </p:blipFill>
         <p:spPr>
           <a:xfrm>
-            <a:off x="2419350" y="1644650"/>
-            <a:ext cx="2554674" cy="646331"/>
+            <a:off x="456574" y="1662370"/>
+            <a:ext cx="8459451" cy="2038789"/>
           </a:xfrm>
           <a:prstGeom prst="rect">
             <a:avLst/>
           </a:prstGeom>
-          <a:noFill/>
         </p:spPr>
-        <p:txBody>
-          <a:bodyPr wrap="none" rtlCol="0">
-            <a:spAutoFit/>
-          </a:bodyPr>
-          <a:lstStyle/>
-          <a:p>
-            <a:pPr marL="285750" indent="-285750">
-              <a:buFont typeface="Arial" panose="020B0604020202020204" pitchFamily="34" charset="0"/>
-              <a:buChar char="•"/>
-            </a:pPr>
-            <a:r>
-              <a:rPr lang="en-US" dirty="0"/>
-              <a:t>Multitenancy</a:t>
-            </a:r>
-          </a:p>
-          <a:p>
-            <a:pPr marL="285750" indent="-285750">
-              <a:buFont typeface="Arial" panose="020B0604020202020204" pitchFamily="34" charset="0"/>
-              <a:buChar char="•"/>
-            </a:pPr>
-            <a:r>
-              <a:rPr lang="en-US" dirty="0" err="1"/>
-              <a:t>Filtros</a:t>
-            </a:r>
-            <a:r>
-              <a:rPr lang="en-US" dirty="0"/>
-              <a:t> de </a:t>
-            </a:r>
-            <a:r>
-              <a:rPr lang="en-US" dirty="0" err="1"/>
-              <a:t>busca</a:t>
-            </a:r>
-            <a:r>
-              <a:rPr lang="en-US" dirty="0"/>
-              <a:t> global</a:t>
-            </a:r>
-          </a:p>
-        </p:txBody>
-      </p:sp>
+      </p:pic>
+      <p:pic>
+        <p:nvPicPr>
+          <p:cNvPr id="9" name="Imagem 8">
+            <a:extLst>
+              <a:ext uri="{FF2B5EF4-FFF2-40B4-BE49-F238E27FC236}">
+                <a16:creationId xmlns:a16="http://schemas.microsoft.com/office/drawing/2014/main" id="{A52E9B8B-06F4-4D38-9323-B0B9526952F1}"/>
+              </a:ext>
+            </a:extLst>
+          </p:cNvPr>
+          <p:cNvPicPr>
+            <a:picLocks noChangeAspect="1"/>
+          </p:cNvPicPr>
+          <p:nvPr/>
+        </p:nvPicPr>
+        <p:blipFill>
+          <a:blip r:embed="rId3"/>
+          <a:stretch>
+            <a:fillRect/>
+          </a:stretch>
+        </p:blipFill>
+        <p:spPr>
+          <a:xfrm>
+            <a:off x="403225" y="1447361"/>
+            <a:ext cx="8566150" cy="2468809"/>
+          </a:xfrm>
+          <a:prstGeom prst="rect">
+            <a:avLst/>
+          </a:prstGeom>
+        </p:spPr>
+      </p:pic>
     </p:spTree>
     <p:extLst>
       <p:ext uri="{BB962C8B-B14F-4D97-AF65-F5344CB8AC3E}">
@@ -6289,10 +7039,146 @@
   <p:clrMapOvr>
     <a:masterClrMapping/>
   </p:clrMapOvr>
+  <p:timing>
+    <p:tnLst>
+      <p:par>
+        <p:cTn id="1" dur="indefinite" restart="never" nodeType="tmRoot">
+          <p:childTnLst>
+            <p:seq concurrent="1" nextAc="seek">
+              <p:cTn id="2" dur="indefinite" nodeType="mainSeq">
+                <p:childTnLst>
+                  <p:par>
+                    <p:cTn id="3" fill="hold">
+                      <p:stCondLst>
+                        <p:cond delay="indefinite"/>
+                      </p:stCondLst>
+                      <p:childTnLst>
+                        <p:par>
+                          <p:cTn id="4" fill="hold">
+                            <p:stCondLst>
+                              <p:cond delay="0"/>
+                            </p:stCondLst>
+                            <p:childTnLst>
+                              <p:par>
+                                <p:cTn id="5" presetID="10" presetClass="entr" presetSubtype="0" fill="hold" nodeType="clickEffect">
+                                  <p:stCondLst>
+                                    <p:cond delay="0"/>
+                                  </p:stCondLst>
+                                  <p:childTnLst>
+                                    <p:set>
+                                      <p:cBhvr>
+                                        <p:cTn id="6" dur="1" fill="hold">
+                                          <p:stCondLst>
+                                            <p:cond delay="0"/>
+                                          </p:stCondLst>
+                                        </p:cTn>
+                                        <p:tgtEl>
+                                          <p:spTgt spid="11"/>
+                                        </p:tgtEl>
+                                        <p:attrNameLst>
+                                          <p:attrName>style.visibility</p:attrName>
+                                        </p:attrNameLst>
+                                      </p:cBhvr>
+                                      <p:to>
+                                        <p:strVal val="visible"/>
+                                      </p:to>
+                                    </p:set>
+                                    <p:animEffect transition="in" filter="fade">
+                                      <p:cBhvr>
+                                        <p:cTn id="7" dur="500"/>
+                                        <p:tgtEl>
+                                          <p:spTgt spid="11"/>
+                                        </p:tgtEl>
+                                      </p:cBhvr>
+                                    </p:animEffect>
+                                  </p:childTnLst>
+                                </p:cTn>
+                              </p:par>
+                            </p:childTnLst>
+                          </p:cTn>
+                        </p:par>
+                      </p:childTnLst>
+                    </p:cTn>
+                  </p:par>
+                  <p:par>
+                    <p:cTn id="8" fill="hold">
+                      <p:stCondLst>
+                        <p:cond delay="indefinite"/>
+                      </p:stCondLst>
+                      <p:childTnLst>
+                        <p:par>
+                          <p:cTn id="9" fill="hold">
+                            <p:stCondLst>
+                              <p:cond delay="0"/>
+                            </p:stCondLst>
+                            <p:childTnLst>
+                              <p:par>
+                                <p:cTn id="10" presetID="10" presetClass="entr" presetSubtype="0" fill="hold" nodeType="clickEffect">
+                                  <p:stCondLst>
+                                    <p:cond delay="0"/>
+                                  </p:stCondLst>
+                                  <p:childTnLst>
+                                    <p:set>
+                                      <p:cBhvr>
+                                        <p:cTn id="11" dur="1" fill="hold">
+                                          <p:stCondLst>
+                                            <p:cond delay="0"/>
+                                          </p:stCondLst>
+                                        </p:cTn>
+                                        <p:tgtEl>
+                                          <p:spTgt spid="9"/>
+                                        </p:tgtEl>
+                                        <p:attrNameLst>
+                                          <p:attrName>style.visibility</p:attrName>
+                                        </p:attrNameLst>
+                                      </p:cBhvr>
+                                      <p:to>
+                                        <p:strVal val="visible"/>
+                                      </p:to>
+                                    </p:set>
+                                    <p:animEffect transition="in" filter="fade">
+                                      <p:cBhvr>
+                                        <p:cTn id="12" dur="500"/>
+                                        <p:tgtEl>
+                                          <p:spTgt spid="9"/>
+                                        </p:tgtEl>
+                                      </p:cBhvr>
+                                    </p:animEffect>
+                                  </p:childTnLst>
+                                </p:cTn>
+                              </p:par>
+                            </p:childTnLst>
+                          </p:cTn>
+                        </p:par>
+                      </p:childTnLst>
+                    </p:cTn>
+                  </p:par>
+                </p:childTnLst>
+              </p:cTn>
+              <p:prevCondLst>
+                <p:cond evt="onPrev" delay="0">
+                  <p:tgtEl>
+                    <p:sldTgt/>
+                  </p:tgtEl>
+                </p:cond>
+              </p:prevCondLst>
+              <p:nextCondLst>
+                <p:cond evt="onNext" delay="0">
+                  <p:tgtEl>
+                    <p:sldTgt/>
+                  </p:tgtEl>
+                </p:cond>
+              </p:nextCondLst>
+            </p:seq>
+          </p:childTnLst>
+        </p:cTn>
+      </p:par>
+    </p:tnLst>
+  </p:timing>
 </p:sld>
 </file>
 
-<file path=ppt/slides/slide12.xml><?xml version="1.0" encoding="utf-8"?>
+<file path=ppt/slides/slide13.xml><?xml version="1.0" encoding="utf-8"?>
 <p:sld xmlns:a="http://schemas.openxmlformats.org/drawingml/2006/main" xmlns:r="http://schemas.openxmlformats.org/officeDocument/2006/relationships" xmlns:p="http://schemas.openxmlformats.org/presentationml/2006/main">
   <p:cSld>
     <p:spTree>
@@ -7561,7 +8447,7 @@
 </p:sld>
 </file>
 
-<file path=ppt/slides/slide13.xml><?xml version="1.0" encoding="utf-8"?>
+<file path=ppt/slides/slide14.xml><?xml version="1.0" encoding="utf-8"?>
 <p:sld xmlns:a="http://schemas.openxmlformats.org/drawingml/2006/main" xmlns:r="http://schemas.openxmlformats.org/officeDocument/2006/relationships" xmlns:p="http://schemas.openxmlformats.org/presentationml/2006/main">
   <p:cSld>
     <p:spTree>
@@ -11931,6 +12817,228 @@
           </a:p>
         </p:txBody>
       </p:sp>
+      <p:sp>
+        <p:nvSpPr>
+          <p:cNvPr id="3" name="Elipse 2">
+            <a:extLst>
+              <a:ext uri="{FF2B5EF4-FFF2-40B4-BE49-F238E27FC236}">
+                <a16:creationId xmlns:a16="http://schemas.microsoft.com/office/drawing/2014/main" id="{3C25EBF0-81FD-4859-ADBA-959721859906}"/>
+              </a:ext>
+            </a:extLst>
+          </p:cNvPr>
+          <p:cNvSpPr/>
+          <p:nvPr/>
+        </p:nvSpPr>
+        <p:spPr>
+          <a:xfrm>
+            <a:off x="1397204" y="1901951"/>
+            <a:ext cx="1367942" cy="738835"/>
+          </a:xfrm>
+          <a:prstGeom prst="ellipse">
+            <a:avLst/>
+          </a:prstGeom>
+        </p:spPr>
+        <p:style>
+          <a:lnRef idx="2">
+            <a:schemeClr val="accent2">
+              <a:shade val="50000"/>
+            </a:schemeClr>
+          </a:lnRef>
+          <a:fillRef idx="1">
+            <a:schemeClr val="accent2"/>
+          </a:fillRef>
+          <a:effectRef idx="0">
+            <a:schemeClr val="accent2"/>
+          </a:effectRef>
+          <a:fontRef idx="minor">
+            <a:schemeClr val="lt1"/>
+          </a:fontRef>
+        </p:style>
+        <p:txBody>
+          <a:bodyPr rtlCol="0" anchor="ctr"/>
+          <a:lstStyle/>
+          <a:p>
+            <a:pPr algn="ctr"/>
+            <a:r>
+              <a:rPr lang="en-US" dirty="0" err="1"/>
+              <a:t>ISession</a:t>
+            </a:r>
+            <a:endParaRPr lang="en-US" dirty="0"/>
+          </a:p>
+        </p:txBody>
+      </p:sp>
+      <p:sp>
+        <p:nvSpPr>
+          <p:cNvPr id="4" name="Seta: para a Direita 3">
+            <a:extLst>
+              <a:ext uri="{FF2B5EF4-FFF2-40B4-BE49-F238E27FC236}">
+                <a16:creationId xmlns:a16="http://schemas.microsoft.com/office/drawing/2014/main" id="{5A4EAA73-80EE-46A7-A5BF-D92E1962B5FD}"/>
+              </a:ext>
+            </a:extLst>
+          </p:cNvPr>
+          <p:cNvSpPr/>
+          <p:nvPr/>
+        </p:nvSpPr>
+        <p:spPr>
+          <a:xfrm>
+            <a:off x="2882188" y="2220162"/>
+            <a:ext cx="3496668" cy="102412"/>
+          </a:xfrm>
+          <a:prstGeom prst="rightArrow">
+            <a:avLst/>
+          </a:prstGeom>
+        </p:spPr>
+        <p:style>
+          <a:lnRef idx="2">
+            <a:schemeClr val="accent1">
+              <a:shade val="50000"/>
+            </a:schemeClr>
+          </a:lnRef>
+          <a:fillRef idx="1">
+            <a:schemeClr val="accent1"/>
+          </a:fillRef>
+          <a:effectRef idx="0">
+            <a:schemeClr val="accent1"/>
+          </a:effectRef>
+          <a:fontRef idx="minor">
+            <a:schemeClr val="lt1"/>
+          </a:fontRef>
+        </p:style>
+        <p:txBody>
+          <a:bodyPr rtlCol="0" anchor="ctr"/>
+          <a:lstStyle/>
+          <a:p>
+            <a:pPr algn="ctr"/>
+            <a:endParaRPr lang="en-US"/>
+          </a:p>
+        </p:txBody>
+      </p:sp>
+      <p:sp>
+        <p:nvSpPr>
+          <p:cNvPr id="5" name="Seta: para a Direita 4">
+            <a:extLst>
+              <a:ext uri="{FF2B5EF4-FFF2-40B4-BE49-F238E27FC236}">
+                <a16:creationId xmlns:a16="http://schemas.microsoft.com/office/drawing/2014/main" id="{DC36D35D-D2AC-413F-B922-340471B5DCD7}"/>
+              </a:ext>
+            </a:extLst>
+          </p:cNvPr>
+          <p:cNvSpPr/>
+          <p:nvPr/>
+        </p:nvSpPr>
+        <p:spPr>
+          <a:xfrm rot="5400000">
+            <a:off x="4157243" y="2776884"/>
+            <a:ext cx="888036" cy="88087"/>
+          </a:xfrm>
+          <a:prstGeom prst="rightArrow">
+            <a:avLst/>
+          </a:prstGeom>
+        </p:spPr>
+        <p:style>
+          <a:lnRef idx="2">
+            <a:schemeClr val="accent1">
+              <a:shade val="50000"/>
+            </a:schemeClr>
+          </a:lnRef>
+          <a:fillRef idx="1">
+            <a:schemeClr val="accent1"/>
+          </a:fillRef>
+          <a:effectRef idx="0">
+            <a:schemeClr val="accent1"/>
+          </a:effectRef>
+          <a:fontRef idx="minor">
+            <a:schemeClr val="lt1"/>
+          </a:fontRef>
+        </p:style>
+        <p:txBody>
+          <a:bodyPr rtlCol="0" anchor="ctr"/>
+          <a:lstStyle/>
+          <a:p>
+            <a:pPr algn="ctr"/>
+            <a:endParaRPr lang="en-US"/>
+          </a:p>
+        </p:txBody>
+      </p:sp>
+      <p:pic>
+        <p:nvPicPr>
+          <p:cNvPr id="6" name="Imagem 5">
+            <a:extLst>
+              <a:ext uri="{FF2B5EF4-FFF2-40B4-BE49-F238E27FC236}">
+                <a16:creationId xmlns:a16="http://schemas.microsoft.com/office/drawing/2014/main" id="{179DE208-B7D9-42B4-BAB2-C6DD4E1B1071}"/>
+              </a:ext>
+            </a:extLst>
+          </p:cNvPr>
+          <p:cNvPicPr>
+            <a:picLocks noChangeAspect="1"/>
+          </p:cNvPicPr>
+          <p:nvPr/>
+        </p:nvPicPr>
+        <p:blipFill>
+          <a:blip r:embed="rId2"/>
+          <a:stretch>
+            <a:fillRect/>
+          </a:stretch>
+        </p:blipFill>
+        <p:spPr>
+          <a:xfrm>
+            <a:off x="6495898" y="1745499"/>
+            <a:ext cx="785648" cy="949325"/>
+          </a:xfrm>
+          <a:prstGeom prst="rect">
+            <a:avLst/>
+          </a:prstGeom>
+        </p:spPr>
+      </p:pic>
+      <p:sp>
+        <p:nvSpPr>
+          <p:cNvPr id="7" name="Elipse 6">
+            <a:extLst>
+              <a:ext uri="{FF2B5EF4-FFF2-40B4-BE49-F238E27FC236}">
+                <a16:creationId xmlns:a16="http://schemas.microsoft.com/office/drawing/2014/main" id="{C34FCEB7-5F1A-4E25-BDAA-50CD39DC047A}"/>
+              </a:ext>
+            </a:extLst>
+          </p:cNvPr>
+          <p:cNvSpPr/>
+          <p:nvPr/>
+        </p:nvSpPr>
+        <p:spPr>
+          <a:xfrm>
+            <a:off x="3659429" y="3473501"/>
+            <a:ext cx="1825142" cy="681534"/>
+          </a:xfrm>
+          <a:prstGeom prst="ellipse">
+            <a:avLst/>
+          </a:prstGeom>
+        </p:spPr>
+        <p:style>
+          <a:lnRef idx="2">
+            <a:schemeClr val="accent2">
+              <a:shade val="50000"/>
+            </a:schemeClr>
+          </a:lnRef>
+          <a:fillRef idx="1">
+            <a:schemeClr val="accent2"/>
+          </a:fillRef>
+          <a:effectRef idx="0">
+            <a:schemeClr val="accent2"/>
+          </a:effectRef>
+          <a:fontRef idx="minor">
+            <a:schemeClr val="lt1"/>
+          </a:fontRef>
+        </p:style>
+        <p:txBody>
+          <a:bodyPr rtlCol="0" anchor="ctr"/>
+          <a:lstStyle/>
+          <a:p>
+            <a:pPr algn="ctr"/>
+            <a:r>
+              <a:rPr lang="en-US" dirty="0" err="1"/>
+              <a:t>IInterceptor</a:t>
+            </a:r>
+            <a:endParaRPr lang="en-US" dirty="0"/>
+          </a:p>
+        </p:txBody>
+      </p:sp>
     </p:spTree>
     <p:extLst>
       <p:ext uri="{BB962C8B-B14F-4D97-AF65-F5344CB8AC3E}">

</xml_diff>

<commit_message>
Ajustes antes da apresentação.
</commit_message>
<xml_diff>
--- a/Docs/ApresentacaoNHibernateAvancado.pptx
+++ b/Docs/ApresentacaoNHibernateAvancado.pptx
@@ -1557,7 +1557,7 @@
           <a:p>
             <a:fld id="{4BDF68E2-58F2-4D09-BE8B-E3BD06533059}" type="datetimeFigureOut">
               <a:rPr lang="en-US" dirty="0"/>
-              <a:t>3/25/2019</a:t>
+              <a:t>3/26/2019</a:t>
             </a:fld>
             <a:endParaRPr lang="en-US" dirty="0"/>
           </a:p>
@@ -1775,7 +1775,7 @@
           <a:p>
             <a:fld id="{2E2D6473-DF6D-4702-B328-E0DD40540A4E}" type="datetimeFigureOut">
               <a:rPr lang="en-US" dirty="0"/>
-              <a:t>3/25/2019</a:t>
+              <a:t>3/26/2019</a:t>
             </a:fld>
             <a:endParaRPr lang="en-US" dirty="0"/>
           </a:p>
@@ -2041,7 +2041,7 @@
           <a:p>
             <a:fld id="{E26F7E3A-B166-407D-9866-32884E7D5B37}" type="datetimeFigureOut">
               <a:rPr lang="en-US" dirty="0"/>
-              <a:t>3/25/2019</a:t>
+              <a:t>3/26/2019</a:t>
             </a:fld>
             <a:endParaRPr lang="en-US" dirty="0"/>
           </a:p>
@@ -3083,7 +3083,7 @@
           <a:p>
             <a:fld id="{528FC5F6-F338-4AE4-BB23-26385BCFC423}" type="datetimeFigureOut">
               <a:rPr lang="en-US" dirty="0"/>
-              <a:t>3/25/2019</a:t>
+              <a:t>3/26/2019</a:t>
             </a:fld>
             <a:endParaRPr lang="en-US" dirty="0"/>
           </a:p>
@@ -3436,7 +3436,7 @@
           <a:p>
             <a:fld id="{20EBB0C4-6273-4C6E-B9BD-2EDC30F1CD52}" type="datetimeFigureOut">
               <a:rPr lang="en-US" dirty="0"/>
-              <a:t>3/25/2019</a:t>
+              <a:t>3/26/2019</a:t>
             </a:fld>
             <a:endParaRPr lang="en-US" dirty="0"/>
           </a:p>
@@ -3721,7 +3721,7 @@
           <a:p>
             <a:fld id="{19AB4D41-86C1-4908-B66A-0B50CEB3BF29}" type="datetimeFigureOut">
               <a:rPr lang="en-US" dirty="0"/>
-              <a:t>3/25/2019</a:t>
+              <a:t>3/26/2019</a:t>
             </a:fld>
             <a:endParaRPr lang="en-US" dirty="0"/>
           </a:p>
@@ -4110,7 +4110,7 @@
           <a:p>
             <a:fld id="{E6426E2C-56C1-4E0D-A793-0088A7FDD37E}" type="datetimeFigureOut">
               <a:rPr lang="en-US" dirty="0"/>
-              <a:t>3/25/2019</a:t>
+              <a:t>3/26/2019</a:t>
             </a:fld>
             <a:endParaRPr lang="en-US" dirty="0"/>
           </a:p>
@@ -4238,7 +4238,7 @@
           <a:p>
             <a:fld id="{C8C39B41-D8B5-4052-B551-9B5525EAA8B6}" type="datetimeFigureOut">
               <a:rPr lang="en-US" dirty="0"/>
-              <a:t>3/25/2019</a:t>
+              <a:t>3/26/2019</a:t>
             </a:fld>
             <a:endParaRPr lang="en-US" dirty="0"/>
           </a:p>
@@ -4419,7 +4419,7 @@
           <a:p>
             <a:fld id="{4D94136C-8742-45B2-AF27-D93DF72833A9}" type="datetimeFigureOut">
               <a:rPr lang="en-US" dirty="0"/>
-              <a:t>3/25/2019</a:t>
+              <a:t>3/26/2019</a:t>
             </a:fld>
             <a:endParaRPr lang="en-US" dirty="0"/>
           </a:p>
@@ -4783,7 +4783,7 @@
           <a:p>
             <a:fld id="{32ABBEA6-7C60-4B02-AE87-00D78D8422AF}" type="datetimeFigureOut">
               <a:rPr lang="en-US" dirty="0"/>
-              <a:t>3/25/2019</a:t>
+              <a:t>3/26/2019</a:t>
             </a:fld>
             <a:endParaRPr lang="en-US" dirty="0"/>
           </a:p>
@@ -5175,7 +5175,7 @@
           <a:p>
             <a:fld id="{C9CAD897-D46E-4AD2-BD9B-49DD3E640873}" type="datetimeFigureOut">
               <a:rPr lang="en-US" dirty="0"/>
-              <a:t>3/25/2019</a:t>
+              <a:t>3/26/2019</a:t>
             </a:fld>
             <a:endParaRPr lang="en-US" dirty="0"/>
           </a:p>
@@ -5472,7 +5472,7 @@
           <a:p>
             <a:fld id="{98624D31-43A5-475A-80CF-332C9F6DCF35}" type="datetimeFigureOut">
               <a:rPr lang="en-US" dirty="0"/>
-              <a:t>3/25/2019</a:t>
+              <a:t>3/26/2019</a:t>
             </a:fld>
             <a:endParaRPr lang="en-US" dirty="0"/>
           </a:p>
@@ -7308,7 +7308,7 @@
                             </p:stCondLst>
                             <p:childTnLst>
                               <p:par>
-                                <p:cTn id="5" presetID="10" presetClass="entr" presetSubtype="0" fill="hold" nodeType="clickEffect">
+                                <p:cTn id="5" presetID="14" presetClass="entr" presetSubtype="10" fill="hold" nodeType="clickEffect">
                                   <p:stCondLst>
                                     <p:cond delay="0"/>
                                   </p:stCondLst>
@@ -7331,7 +7331,7 @@
                                         <p:strVal val="visible"/>
                                       </p:to>
                                     </p:set>
-                                    <p:animEffect transition="in" filter="fade">
+                                    <p:animEffect transition="in" filter="randombar(horizontal)">
                                       <p:cBhvr>
                                         <p:cTn id="7" dur="500"/>
                                         <p:tgtEl>
@@ -7361,7 +7361,7 @@
                             </p:stCondLst>
                             <p:childTnLst>
                               <p:par>
-                                <p:cTn id="10" presetID="10" presetClass="entr" presetSubtype="0" fill="hold" nodeType="clickEffect">
+                                <p:cTn id="10" presetID="14" presetClass="entr" presetSubtype="10" fill="hold" nodeType="clickEffect">
                                   <p:stCondLst>
                                     <p:cond delay="0"/>
                                   </p:stCondLst>
@@ -7384,7 +7384,7 @@
                                         <p:strVal val="visible"/>
                                       </p:to>
                                     </p:set>
-                                    <p:animEffect transition="in" filter="fade">
+                                    <p:animEffect transition="in" filter="randombar(horizontal)">
                                       <p:cBhvr>
                                         <p:cTn id="12" dur="500"/>
                                         <p:tgtEl>
@@ -10456,13 +10456,14 @@
               <a:buAutoNum type="arabicPeriod"/>
             </a:pPr>
             <a:r>
+              <a:rPr lang="en-US" dirty="0"/>
+              <a:t>Teste de </a:t>
+            </a:r>
+            <a:r>
               <a:rPr lang="en-US" dirty="0" err="1"/>
               <a:t>Mapeamento</a:t>
             </a:r>
-            <a:r>
-              <a:rPr lang="en-US" dirty="0"/>
-              <a:t> e Teste</a:t>
-            </a:r>
+            <a:endParaRPr lang="en-US" dirty="0"/>
           </a:p>
           <a:p>
             <a:pPr marL="482600" lvl="0" indent="-342900" algn="l" rtl="0">
@@ -11389,7 +11390,7 @@
           </a:bodyPr>
           <a:lstStyle/>
           <a:p>
-            <a:pPr marL="0" lvl="0" indent="0" algn="l" rtl="0">
+            <a:pPr marL="0" lvl="0" indent="0" algn="ctr" rtl="0">
               <a:spcBef>
                 <a:spcPts val="0"/>
               </a:spcBef>
@@ -11399,17 +11400,47 @@
               <a:buNone/>
             </a:pPr>
             <a:r>
+              <a:rPr lang="en-US" dirty="0"/>
+              <a:t>Teste de </a:t>
+            </a:r>
+            <a:r>
               <a:rPr lang="en-US" dirty="0" err="1"/>
               <a:t>Mapeamento</a:t>
             </a:r>
-            <a:r>
-              <a:rPr lang="en-US" dirty="0"/>
-              <a:t> e Teste</a:t>
-            </a:r>
             <a:endParaRPr dirty="0"/>
           </a:p>
         </p:txBody>
       </p:sp>
+      <p:pic>
+        <p:nvPicPr>
+          <p:cNvPr id="3" name="Imagem 2">
+            <a:extLst>
+              <a:ext uri="{FF2B5EF4-FFF2-40B4-BE49-F238E27FC236}">
+                <a16:creationId xmlns:a16="http://schemas.microsoft.com/office/drawing/2014/main" id="{2CB7B259-BD69-4086-A2FB-241D7E256B73}"/>
+              </a:ext>
+            </a:extLst>
+          </p:cNvPr>
+          <p:cNvPicPr>
+            <a:picLocks noChangeAspect="1"/>
+          </p:cNvPicPr>
+          <p:nvPr/>
+        </p:nvPicPr>
+        <p:blipFill>
+          <a:blip r:embed="rId3"/>
+          <a:stretch>
+            <a:fillRect/>
+          </a:stretch>
+        </p:blipFill>
+        <p:spPr>
+          <a:xfrm>
+            <a:off x="1618838" y="1592071"/>
+            <a:ext cx="5906324" cy="2734057"/>
+          </a:xfrm>
+          <a:prstGeom prst="rect">
+            <a:avLst/>
+          </a:prstGeom>
+        </p:spPr>
+      </p:pic>
     </p:spTree>
     <p:extLst>
       <p:ext uri="{BB962C8B-B14F-4D97-AF65-F5344CB8AC3E}">
@@ -11420,6 +11451,89 @@
   <p:clrMapOvr>
     <a:masterClrMapping/>
   </p:clrMapOvr>
+  <p:timing>
+    <p:tnLst>
+      <p:par>
+        <p:cTn id="1" dur="indefinite" restart="never" nodeType="tmRoot">
+          <p:childTnLst>
+            <p:seq concurrent="1" nextAc="seek">
+              <p:cTn id="2" dur="indefinite" nodeType="mainSeq">
+                <p:childTnLst>
+                  <p:par>
+                    <p:cTn id="3" fill="hold">
+                      <p:stCondLst>
+                        <p:cond delay="indefinite"/>
+                      </p:stCondLst>
+                      <p:childTnLst>
+                        <p:par>
+                          <p:cTn id="4" fill="hold">
+                            <p:stCondLst>
+                              <p:cond delay="0"/>
+                            </p:stCondLst>
+                            <p:childTnLst>
+                              <p:par>
+                                <p:cTn id="5" presetID="14" presetClass="entr" presetSubtype="10" fill="hold" nodeType="clickEffect">
+                                  <p:stCondLst>
+                                    <p:cond delay="0"/>
+                                  </p:stCondLst>
+                                  <p:childTnLst>
+                                    <p:set>
+                                      <p:cBhvr>
+                                        <p:cTn id="6" dur="1" fill="hold">
+                                          <p:stCondLst>
+                                            <p:cond delay="0"/>
+                                          </p:stCondLst>
+                                        </p:cTn>
+                                        <p:tgtEl>
+                                          <p:spTgt spid="3"/>
+                                        </p:tgtEl>
+                                        <p:attrNameLst>
+                                          <p:attrName>style.visibility</p:attrName>
+                                        </p:attrNameLst>
+                                      </p:cBhvr>
+                                      <p:to>
+                                        <p:strVal val="visible"/>
+                                      </p:to>
+                                    </p:set>
+                                    <p:animEffect transition="in" filter="randombar(horizontal)">
+                                      <p:cBhvr>
+                                        <p:cTn id="7" dur="500"/>
+                                        <p:tgtEl>
+                                          <p:spTgt spid="3"/>
+                                        </p:tgtEl>
+                                      </p:cBhvr>
+                                    </p:animEffect>
+                                  </p:childTnLst>
+                                </p:cTn>
+                              </p:par>
+                            </p:childTnLst>
+                          </p:cTn>
+                        </p:par>
+                      </p:childTnLst>
+                    </p:cTn>
+                  </p:par>
+                </p:childTnLst>
+              </p:cTn>
+              <p:prevCondLst>
+                <p:cond evt="onPrev" delay="0">
+                  <p:tgtEl>
+                    <p:sldTgt/>
+                  </p:tgtEl>
+                </p:cond>
+              </p:prevCondLst>
+              <p:nextCondLst>
+                <p:cond evt="onNext" delay="0">
+                  <p:tgtEl>
+                    <p:sldTgt/>
+                  </p:tgtEl>
+                </p:cond>
+              </p:nextCondLst>
+            </p:seq>
+          </p:childTnLst>
+        </p:cTn>
+      </p:par>
+    </p:tnLst>
+  </p:timing>
 </p:sld>
 </file>
 

</xml_diff>

<commit_message>
Incluindo o tema veronez.dev
</commit_message>
<xml_diff>
--- a/Docs/ApresentacaoNHibernateAvancado.pptx
+++ b/Docs/ApresentacaoNHibernateAvancado.pptx
@@ -1557,7 +1557,7 @@
           <a:p>
             <a:fld id="{4BDF68E2-58F2-4D09-BE8B-E3BD06533059}" type="datetimeFigureOut">
               <a:rPr lang="en-US" dirty="0"/>
-              <a:t>3/26/2019</a:t>
+              <a:t>8/25/2019</a:t>
             </a:fld>
             <a:endParaRPr lang="en-US" dirty="0"/>
           </a:p>
@@ -1775,7 +1775,7 @@
           <a:p>
             <a:fld id="{2E2D6473-DF6D-4702-B328-E0DD40540A4E}" type="datetimeFigureOut">
               <a:rPr lang="en-US" dirty="0"/>
-              <a:t>3/26/2019</a:t>
+              <a:t>8/25/2019</a:t>
             </a:fld>
             <a:endParaRPr lang="en-US" dirty="0"/>
           </a:p>
@@ -2041,7 +2041,7 @@
           <a:p>
             <a:fld id="{E26F7E3A-B166-407D-9866-32884E7D5B37}" type="datetimeFigureOut">
               <a:rPr lang="en-US" dirty="0"/>
-              <a:t>3/26/2019</a:t>
+              <a:t>8/25/2019</a:t>
             </a:fld>
             <a:endParaRPr lang="en-US" dirty="0"/>
           </a:p>
@@ -3083,7 +3083,7 @@
           <a:p>
             <a:fld id="{528FC5F6-F338-4AE4-BB23-26385BCFC423}" type="datetimeFigureOut">
               <a:rPr lang="en-US" dirty="0"/>
-              <a:t>3/26/2019</a:t>
+              <a:t>8/25/2019</a:t>
             </a:fld>
             <a:endParaRPr lang="en-US" dirty="0"/>
           </a:p>
@@ -3436,7 +3436,7 @@
           <a:p>
             <a:fld id="{20EBB0C4-6273-4C6E-B9BD-2EDC30F1CD52}" type="datetimeFigureOut">
               <a:rPr lang="en-US" dirty="0"/>
-              <a:t>3/26/2019</a:t>
+              <a:t>8/25/2019</a:t>
             </a:fld>
             <a:endParaRPr lang="en-US" dirty="0"/>
           </a:p>
@@ -3721,7 +3721,7 @@
           <a:p>
             <a:fld id="{19AB4D41-86C1-4908-B66A-0B50CEB3BF29}" type="datetimeFigureOut">
               <a:rPr lang="en-US" dirty="0"/>
-              <a:t>3/26/2019</a:t>
+              <a:t>8/25/2019</a:t>
             </a:fld>
             <a:endParaRPr lang="en-US" dirty="0"/>
           </a:p>
@@ -4110,7 +4110,7 @@
           <a:p>
             <a:fld id="{E6426E2C-56C1-4E0D-A793-0088A7FDD37E}" type="datetimeFigureOut">
               <a:rPr lang="en-US" dirty="0"/>
-              <a:t>3/26/2019</a:t>
+              <a:t>8/25/2019</a:t>
             </a:fld>
             <a:endParaRPr lang="en-US" dirty="0"/>
           </a:p>
@@ -4238,7 +4238,7 @@
           <a:p>
             <a:fld id="{C8C39B41-D8B5-4052-B551-9B5525EAA8B6}" type="datetimeFigureOut">
               <a:rPr lang="en-US" dirty="0"/>
-              <a:t>3/26/2019</a:t>
+              <a:t>8/25/2019</a:t>
             </a:fld>
             <a:endParaRPr lang="en-US" dirty="0"/>
           </a:p>
@@ -4419,7 +4419,7 @@
           <a:p>
             <a:fld id="{4D94136C-8742-45B2-AF27-D93DF72833A9}" type="datetimeFigureOut">
               <a:rPr lang="en-US" dirty="0"/>
-              <a:t>3/26/2019</a:t>
+              <a:t>8/25/2019</a:t>
             </a:fld>
             <a:endParaRPr lang="en-US" dirty="0"/>
           </a:p>
@@ -4783,7 +4783,7 @@
           <a:p>
             <a:fld id="{32ABBEA6-7C60-4B02-AE87-00D78D8422AF}" type="datetimeFigureOut">
               <a:rPr lang="en-US" dirty="0"/>
-              <a:t>3/26/2019</a:t>
+              <a:t>8/25/2019</a:t>
             </a:fld>
             <a:endParaRPr lang="en-US" dirty="0"/>
           </a:p>
@@ -5175,7 +5175,7 @@
           <a:p>
             <a:fld id="{C9CAD897-D46E-4AD2-BD9B-49DD3E640873}" type="datetimeFigureOut">
               <a:rPr lang="en-US" dirty="0"/>
-              <a:t>3/26/2019</a:t>
+              <a:t>8/25/2019</a:t>
             </a:fld>
             <a:endParaRPr lang="en-US" dirty="0"/>
           </a:p>
@@ -5472,7 +5472,7 @@
           <a:p>
             <a:fld id="{98624D31-43A5-475A-80CF-332C9F6DCF35}" type="datetimeFigureOut">
               <a:rPr lang="en-US" dirty="0"/>
-              <a:t>3/26/2019</a:t>
+              <a:t>8/25/2019</a:t>
             </a:fld>
             <a:endParaRPr lang="en-US" dirty="0"/>
           </a:p>
@@ -7486,8 +7486,8 @@
         </p:nvSpPr>
         <p:spPr>
           <a:xfrm>
-            <a:off x="3870960" y="2000250"/>
-            <a:ext cx="1447800" cy="457200"/>
+            <a:off x="3870960" y="2000249"/>
+            <a:ext cx="1447798" cy="604005"/>
           </a:xfrm>
           <a:prstGeom prst="ellipse">
             <a:avLst/>
@@ -7515,57 +7515,12 @@
           <a:p>
             <a:pPr algn="ctr"/>
             <a:r>
+              <a:rPr lang="en-US" dirty="0" err="1"/>
+              <a:t>Sessão</a:t>
+            </a:r>
+            <a:r>
               <a:rPr lang="en-US" dirty="0"/>
-              <a:t>Session1</a:t>
-            </a:r>
-          </a:p>
-        </p:txBody>
-      </p:sp>
-      <p:sp>
-        <p:nvSpPr>
-          <p:cNvPr id="5" name="Elipse 4">
-            <a:extLst>
-              <a:ext uri="{FF2B5EF4-FFF2-40B4-BE49-F238E27FC236}">
-                <a16:creationId xmlns:a16="http://schemas.microsoft.com/office/drawing/2014/main" id="{14C9A544-7A83-4BC7-9D28-75203EFE8F71}"/>
-              </a:ext>
-            </a:extLst>
-          </p:cNvPr>
-          <p:cNvSpPr/>
-          <p:nvPr/>
-        </p:nvSpPr>
-        <p:spPr>
-          <a:xfrm>
-            <a:off x="3870960" y="2997200"/>
-            <a:ext cx="1447800" cy="457200"/>
-          </a:xfrm>
-          <a:prstGeom prst="ellipse">
-            <a:avLst/>
-          </a:prstGeom>
-        </p:spPr>
-        <p:style>
-          <a:lnRef idx="2">
-            <a:schemeClr val="accent2">
-              <a:shade val="50000"/>
-            </a:schemeClr>
-          </a:lnRef>
-          <a:fillRef idx="1">
-            <a:schemeClr val="accent2"/>
-          </a:fillRef>
-          <a:effectRef idx="0">
-            <a:schemeClr val="accent2"/>
-          </a:effectRef>
-          <a:fontRef idx="minor">
-            <a:schemeClr val="lt1"/>
-          </a:fontRef>
-        </p:style>
-        <p:txBody>
-          <a:bodyPr rtlCol="0" anchor="ctr"/>
-          <a:lstStyle/>
-          <a:p>
-            <a:pPr algn="ctr"/>
-            <a:r>
-              <a:rPr lang="en-US" dirty="0"/>
-              <a:t>Session2</a:t>
+              <a:t> 01</a:t>
             </a:r>
           </a:p>
         </p:txBody>
@@ -7584,8 +7539,8 @@
         </p:nvSpPr>
         <p:spPr>
           <a:xfrm>
-            <a:off x="875972" y="2090737"/>
-            <a:ext cx="1555750" cy="1320800"/>
+            <a:off x="897067" y="2484112"/>
+            <a:ext cx="1526717" cy="785852"/>
           </a:xfrm>
           <a:prstGeom prst="ellipse">
             <a:avLst/>
@@ -7613,10 +7568,9 @@
           <a:p>
             <a:pPr algn="ctr"/>
             <a:r>
-              <a:rPr lang="en-US" dirty="0" err="1"/>
+              <a:rPr lang="en-US" dirty="0"/>
               <a:t>Aplicação</a:t>
             </a:r>
-            <a:endParaRPr lang="en-US" dirty="0"/>
           </a:p>
         </p:txBody>
       </p:sp>
@@ -7652,98 +7606,6 @@
       </p:pic>
       <p:sp>
         <p:nvSpPr>
-          <p:cNvPr id="12" name="Seta: para a Direita 11">
-            <a:extLst>
-              <a:ext uri="{FF2B5EF4-FFF2-40B4-BE49-F238E27FC236}">
-                <a16:creationId xmlns:a16="http://schemas.microsoft.com/office/drawing/2014/main" id="{9BAFDE4A-63E1-4AD6-A620-99A8B3F03ACB}"/>
-              </a:ext>
-            </a:extLst>
-          </p:cNvPr>
-          <p:cNvSpPr/>
-          <p:nvPr/>
-        </p:nvSpPr>
-        <p:spPr>
-          <a:xfrm rot="21139290">
-            <a:off x="2639600" y="2225675"/>
-            <a:ext cx="889000" cy="101600"/>
-          </a:xfrm>
-          <a:prstGeom prst="rightArrow">
-            <a:avLst/>
-          </a:prstGeom>
-        </p:spPr>
-        <p:style>
-          <a:lnRef idx="2">
-            <a:schemeClr val="accent1">
-              <a:shade val="50000"/>
-            </a:schemeClr>
-          </a:lnRef>
-          <a:fillRef idx="1">
-            <a:schemeClr val="accent1"/>
-          </a:fillRef>
-          <a:effectRef idx="0">
-            <a:schemeClr val="accent1"/>
-          </a:effectRef>
-          <a:fontRef idx="minor">
-            <a:schemeClr val="lt1"/>
-          </a:fontRef>
-        </p:style>
-        <p:txBody>
-          <a:bodyPr rtlCol="0" anchor="ctr"/>
-          <a:lstStyle/>
-          <a:p>
-            <a:pPr algn="ctr"/>
-            <a:endParaRPr lang="en-US" dirty="0"/>
-          </a:p>
-        </p:txBody>
-      </p:sp>
-      <p:sp>
-        <p:nvSpPr>
-          <p:cNvPr id="13" name="Seta: para a Direita 12">
-            <a:extLst>
-              <a:ext uri="{FF2B5EF4-FFF2-40B4-BE49-F238E27FC236}">
-                <a16:creationId xmlns:a16="http://schemas.microsoft.com/office/drawing/2014/main" id="{4C495BF2-8062-41CF-A0EC-D058B3716148}"/>
-              </a:ext>
-            </a:extLst>
-          </p:cNvPr>
-          <p:cNvSpPr/>
-          <p:nvPr/>
-        </p:nvSpPr>
-        <p:spPr>
-          <a:xfrm rot="21134343" flipH="1">
-            <a:off x="2675833" y="2445773"/>
-            <a:ext cx="889000" cy="101600"/>
-          </a:xfrm>
-          <a:prstGeom prst="rightArrow">
-            <a:avLst/>
-          </a:prstGeom>
-        </p:spPr>
-        <p:style>
-          <a:lnRef idx="2">
-            <a:schemeClr val="accent1">
-              <a:shade val="50000"/>
-            </a:schemeClr>
-          </a:lnRef>
-          <a:fillRef idx="1">
-            <a:schemeClr val="accent1"/>
-          </a:fillRef>
-          <a:effectRef idx="0">
-            <a:schemeClr val="accent1"/>
-          </a:effectRef>
-          <a:fontRef idx="minor">
-            <a:schemeClr val="lt1"/>
-          </a:fontRef>
-        </p:style>
-        <p:txBody>
-          <a:bodyPr rtlCol="0" anchor="ctr"/>
-          <a:lstStyle/>
-          <a:p>
-            <a:pPr algn="ctr"/>
-            <a:endParaRPr lang="en-US"/>
-          </a:p>
-        </p:txBody>
-      </p:sp>
-      <p:sp>
-        <p:nvSpPr>
           <p:cNvPr id="14" name="Seta: para a Direita 13">
             <a:extLst>
               <a:ext uri="{FF2B5EF4-FFF2-40B4-BE49-F238E27FC236}">
@@ -8020,10 +7882,10 @@
       </p:sp>
       <p:sp>
         <p:nvSpPr>
-          <p:cNvPr id="22" name="Seta: para a Direita 21">
+          <p:cNvPr id="17" name="Elipse 16">
             <a:extLst>
               <a:ext uri="{FF2B5EF4-FFF2-40B4-BE49-F238E27FC236}">
-                <a16:creationId xmlns:a16="http://schemas.microsoft.com/office/drawing/2014/main" id="{C12F3C9B-2876-4061-BCD9-D50F367B6E5C}"/>
+                <a16:creationId xmlns:a16="http://schemas.microsoft.com/office/drawing/2014/main" id="{61B00F3C-A948-4D19-B756-2DF815AE323E}"/>
               </a:ext>
             </a:extLst>
           </p:cNvPr>
@@ -8031,8 +7893,61 @@
           <p:nvPr/>
         </p:nvSpPr>
         <p:spPr>
-          <a:xfrm rot="21139290">
-            <a:off x="2639600" y="2225676"/>
+          <a:xfrm>
+            <a:off x="3873284" y="3028950"/>
+            <a:ext cx="1447798" cy="604005"/>
+          </a:xfrm>
+          <a:prstGeom prst="ellipse">
+            <a:avLst/>
+          </a:prstGeom>
+        </p:spPr>
+        <p:style>
+          <a:lnRef idx="2">
+            <a:schemeClr val="accent2">
+              <a:shade val="50000"/>
+            </a:schemeClr>
+          </a:lnRef>
+          <a:fillRef idx="1">
+            <a:schemeClr val="accent2"/>
+          </a:fillRef>
+          <a:effectRef idx="0">
+            <a:schemeClr val="accent2"/>
+          </a:effectRef>
+          <a:fontRef idx="minor">
+            <a:schemeClr val="lt1"/>
+          </a:fontRef>
+        </p:style>
+        <p:txBody>
+          <a:bodyPr rtlCol="0" anchor="ctr"/>
+          <a:lstStyle/>
+          <a:p>
+            <a:pPr algn="ctr"/>
+            <a:r>
+              <a:rPr lang="en-US" dirty="0" err="1"/>
+              <a:t>Sessão</a:t>
+            </a:r>
+            <a:r>
+              <a:rPr lang="en-US" dirty="0"/>
+              <a:t> 02</a:t>
+            </a:r>
+          </a:p>
+        </p:txBody>
+      </p:sp>
+      <p:sp>
+        <p:nvSpPr>
+          <p:cNvPr id="24" name="Seta: para a Direita 23">
+            <a:extLst>
+              <a:ext uri="{FF2B5EF4-FFF2-40B4-BE49-F238E27FC236}">
+                <a16:creationId xmlns:a16="http://schemas.microsoft.com/office/drawing/2014/main" id="{339D733A-F15B-41E3-B3CB-2DB0DFCC4049}"/>
+              </a:ext>
+            </a:extLst>
+          </p:cNvPr>
+          <p:cNvSpPr/>
+          <p:nvPr/>
+        </p:nvSpPr>
+        <p:spPr>
+          <a:xfrm rot="20918112">
+            <a:off x="2656737" y="2379560"/>
             <a:ext cx="889000" cy="101600"/>
           </a:xfrm>
           <a:prstGeom prst="rightArrow">
@@ -8041,15 +7956,15 @@
         </p:spPr>
         <p:style>
           <a:lnRef idx="2">
-            <a:schemeClr val="accent6">
+            <a:schemeClr val="accent1">
               <a:shade val="50000"/>
             </a:schemeClr>
           </a:lnRef>
           <a:fillRef idx="1">
-            <a:schemeClr val="accent6"/>
+            <a:schemeClr val="accent1"/>
           </a:fillRef>
           <a:effectRef idx="0">
-            <a:schemeClr val="accent6"/>
+            <a:schemeClr val="accent1"/>
           </a:effectRef>
           <a:fontRef idx="minor">
             <a:schemeClr val="lt1"/>
@@ -8060,16 +7975,16 @@
           <a:lstStyle/>
           <a:p>
             <a:pPr algn="ctr"/>
-            <a:endParaRPr lang="en-US" dirty="0"/>
+            <a:endParaRPr lang="en-US"/>
           </a:p>
         </p:txBody>
       </p:sp>
       <p:sp>
         <p:nvSpPr>
-          <p:cNvPr id="23" name="Seta: para a Direita 22">
+          <p:cNvPr id="25" name="Seta: para a Direita 24">
             <a:extLst>
               <a:ext uri="{FF2B5EF4-FFF2-40B4-BE49-F238E27FC236}">
-                <a16:creationId xmlns:a16="http://schemas.microsoft.com/office/drawing/2014/main" id="{39D4FF52-53B3-4C42-A42D-82A0C4F0DBFC}"/>
+                <a16:creationId xmlns:a16="http://schemas.microsoft.com/office/drawing/2014/main" id="{D6800557-A85F-4D88-BD5D-4A50D43752A6}"/>
               </a:ext>
             </a:extLst>
           </p:cNvPr>
@@ -8077,8 +7992,8 @@
           <p:nvPr/>
         </p:nvSpPr>
         <p:spPr>
-          <a:xfrm rot="21134343" flipH="1">
-            <a:off x="2675833" y="2445774"/>
+          <a:xfrm rot="20913165" flipH="1">
+            <a:off x="2730939" y="2553455"/>
             <a:ext cx="889000" cy="101600"/>
           </a:xfrm>
           <a:prstGeom prst="rightArrow">
@@ -8087,15 +8002,15 @@
         </p:spPr>
         <p:style>
           <a:lnRef idx="2">
-            <a:schemeClr val="accent6">
+            <a:schemeClr val="accent1">
               <a:shade val="50000"/>
             </a:schemeClr>
           </a:lnRef>
           <a:fillRef idx="1">
-            <a:schemeClr val="accent6"/>
+            <a:schemeClr val="accent1"/>
           </a:fillRef>
           <a:effectRef idx="0">
-            <a:schemeClr val="accent6"/>
+            <a:schemeClr val="accent1"/>
           </a:effectRef>
           <a:fontRef idx="minor">
             <a:schemeClr val="lt1"/>
@@ -8154,7 +8069,7 @@
                                           </p:stCondLst>
                                         </p:cTn>
                                         <p:tgtEl>
-                                          <p:spTgt spid="12"/>
+                                          <p:spTgt spid="14"/>
                                         </p:tgtEl>
                                         <p:attrNameLst>
                                           <p:attrName>style.visibility</p:attrName>
@@ -8168,7 +8083,7 @@
                                       <p:cBhvr>
                                         <p:cTn id="7" dur="500"/>
                                         <p:tgtEl>
-                                          <p:spTgt spid="12"/>
+                                          <p:spTgt spid="14"/>
                                         </p:tgtEl>
                                       </p:cBhvr>
                                     </p:animEffect>
@@ -8207,7 +8122,7 @@
                                           </p:stCondLst>
                                         </p:cTn>
                                         <p:tgtEl>
-                                          <p:spTgt spid="14"/>
+                                          <p:spTgt spid="15"/>
                                         </p:tgtEl>
                                         <p:attrNameLst>
                                           <p:attrName>style.visibility</p:attrName>
@@ -8221,7 +8136,7 @@
                                       <p:cBhvr>
                                         <p:cTn id="12" dur="500"/>
                                         <p:tgtEl>
-                                          <p:spTgt spid="14"/>
+                                          <p:spTgt spid="15"/>
                                         </p:tgtEl>
                                       </p:cBhvr>
                                     </p:animEffect>
@@ -8260,7 +8175,7 @@
                                           </p:stCondLst>
                                         </p:cTn>
                                         <p:tgtEl>
-                                          <p:spTgt spid="15"/>
+                                          <p:spTgt spid="18"/>
                                         </p:tgtEl>
                                         <p:attrNameLst>
                                           <p:attrName>style.visibility</p:attrName>
@@ -8274,7 +8189,7 @@
                                       <p:cBhvr>
                                         <p:cTn id="17" dur="500"/>
                                         <p:tgtEl>
-                                          <p:spTgt spid="15"/>
+                                          <p:spTgt spid="18"/>
                                         </p:tgtEl>
                                       </p:cBhvr>
                                     </p:animEffect>
@@ -8313,7 +8228,7 @@
                                           </p:stCondLst>
                                         </p:cTn>
                                         <p:tgtEl>
-                                          <p:spTgt spid="13"/>
+                                          <p:spTgt spid="20"/>
                                         </p:tgtEl>
                                         <p:attrNameLst>
                                           <p:attrName>style.visibility</p:attrName>
@@ -8327,7 +8242,7 @@
                                       <p:cBhvr>
                                         <p:cTn id="22" dur="500"/>
                                         <p:tgtEl>
-                                          <p:spTgt spid="13"/>
+                                          <p:spTgt spid="20"/>
                                         </p:tgtEl>
                                       </p:cBhvr>
                                     </p:animEffect>
@@ -8366,7 +8281,7 @@
                                           </p:stCondLst>
                                         </p:cTn>
                                         <p:tgtEl>
-                                          <p:spTgt spid="22"/>
+                                          <p:spTgt spid="21"/>
                                         </p:tgtEl>
                                         <p:attrNameLst>
                                           <p:attrName>style.visibility</p:attrName>
@@ -8380,7 +8295,7 @@
                                       <p:cBhvr>
                                         <p:cTn id="27" dur="500"/>
                                         <p:tgtEl>
-                                          <p:spTgt spid="22"/>
+                                          <p:spTgt spid="21"/>
                                         </p:tgtEl>
                                       </p:cBhvr>
                                     </p:animEffect>
@@ -8419,7 +8334,7 @@
                                           </p:stCondLst>
                                         </p:cTn>
                                         <p:tgtEl>
-                                          <p:spTgt spid="23"/>
+                                          <p:spTgt spid="19"/>
                                         </p:tgtEl>
                                         <p:attrNameLst>
                                           <p:attrName>style.visibility</p:attrName>
@@ -8433,7 +8348,7 @@
                                       <p:cBhvr>
                                         <p:cTn id="32" dur="500"/>
                                         <p:tgtEl>
-                                          <p:spTgt spid="23"/>
+                                          <p:spTgt spid="19"/>
                                         </p:tgtEl>
                                       </p:cBhvr>
                                     </p:animEffect>
@@ -8472,7 +8387,7 @@
                                           </p:stCondLst>
                                         </p:cTn>
                                         <p:tgtEl>
-                                          <p:spTgt spid="18"/>
+                                          <p:spTgt spid="24"/>
                                         </p:tgtEl>
                                         <p:attrNameLst>
                                           <p:attrName>style.visibility</p:attrName>
@@ -8486,7 +8401,7 @@
                                       <p:cBhvr>
                                         <p:cTn id="37" dur="500"/>
                                         <p:tgtEl>
-                                          <p:spTgt spid="18"/>
+                                          <p:spTgt spid="24"/>
                                         </p:tgtEl>
                                       </p:cBhvr>
                                     </p:animEffect>
@@ -8525,7 +8440,7 @@
                                           </p:stCondLst>
                                         </p:cTn>
                                         <p:tgtEl>
-                                          <p:spTgt spid="20"/>
+                                          <p:spTgt spid="25"/>
                                         </p:tgtEl>
                                         <p:attrNameLst>
                                           <p:attrName>style.visibility</p:attrName>
@@ -8539,113 +8454,7 @@
                                       <p:cBhvr>
                                         <p:cTn id="42" dur="500"/>
                                         <p:tgtEl>
-                                          <p:spTgt spid="20"/>
-                                        </p:tgtEl>
-                                      </p:cBhvr>
-                                    </p:animEffect>
-                                  </p:childTnLst>
-                                </p:cTn>
-                              </p:par>
-                            </p:childTnLst>
-                          </p:cTn>
-                        </p:par>
-                      </p:childTnLst>
-                    </p:cTn>
-                  </p:par>
-                  <p:par>
-                    <p:cTn id="43" fill="hold">
-                      <p:stCondLst>
-                        <p:cond delay="indefinite"/>
-                      </p:stCondLst>
-                      <p:childTnLst>
-                        <p:par>
-                          <p:cTn id="44" fill="hold">
-                            <p:stCondLst>
-                              <p:cond delay="0"/>
-                            </p:stCondLst>
-                            <p:childTnLst>
-                              <p:par>
-                                <p:cTn id="45" presetID="10" presetClass="entr" presetSubtype="0" fill="hold" grpId="0" nodeType="clickEffect">
-                                  <p:stCondLst>
-                                    <p:cond delay="0"/>
-                                  </p:stCondLst>
-                                  <p:childTnLst>
-                                    <p:set>
-                                      <p:cBhvr>
-                                        <p:cTn id="46" dur="1" fill="hold">
-                                          <p:stCondLst>
-                                            <p:cond delay="0"/>
-                                          </p:stCondLst>
-                                        </p:cTn>
-                                        <p:tgtEl>
-                                          <p:spTgt spid="21"/>
-                                        </p:tgtEl>
-                                        <p:attrNameLst>
-                                          <p:attrName>style.visibility</p:attrName>
-                                        </p:attrNameLst>
-                                      </p:cBhvr>
-                                      <p:to>
-                                        <p:strVal val="visible"/>
-                                      </p:to>
-                                    </p:set>
-                                    <p:animEffect transition="in" filter="fade">
-                                      <p:cBhvr>
-                                        <p:cTn id="47" dur="500"/>
-                                        <p:tgtEl>
-                                          <p:spTgt spid="21"/>
-                                        </p:tgtEl>
-                                      </p:cBhvr>
-                                    </p:animEffect>
-                                  </p:childTnLst>
-                                </p:cTn>
-                              </p:par>
-                            </p:childTnLst>
-                          </p:cTn>
-                        </p:par>
-                      </p:childTnLst>
-                    </p:cTn>
-                  </p:par>
-                  <p:par>
-                    <p:cTn id="48" fill="hold">
-                      <p:stCondLst>
-                        <p:cond delay="indefinite"/>
-                      </p:stCondLst>
-                      <p:childTnLst>
-                        <p:par>
-                          <p:cTn id="49" fill="hold">
-                            <p:stCondLst>
-                              <p:cond delay="0"/>
-                            </p:stCondLst>
-                            <p:childTnLst>
-                              <p:par>
-                                <p:cTn id="50" presetID="10" presetClass="entr" presetSubtype="0" fill="hold" grpId="0" nodeType="clickEffect">
-                                  <p:stCondLst>
-                                    <p:cond delay="0"/>
-                                  </p:stCondLst>
-                                  <p:childTnLst>
-                                    <p:set>
-                                      <p:cBhvr>
-                                        <p:cTn id="51" dur="1" fill="hold">
-                                          <p:stCondLst>
-                                            <p:cond delay="0"/>
-                                          </p:stCondLst>
-                                        </p:cTn>
-                                        <p:tgtEl>
-                                          <p:spTgt spid="19"/>
-                                        </p:tgtEl>
-                                        <p:attrNameLst>
-                                          <p:attrName>style.visibility</p:attrName>
-                                        </p:attrNameLst>
-                                      </p:cBhvr>
-                                      <p:to>
-                                        <p:strVal val="visible"/>
-                                      </p:to>
-                                    </p:set>
-                                    <p:animEffect transition="in" filter="fade">
-                                      <p:cBhvr>
-                                        <p:cTn id="52" dur="500"/>
-                                        <p:tgtEl>
-                                          <p:spTgt spid="19"/>
+                                          <p:spTgt spid="25"/>
                                         </p:tgtEl>
                                       </p:cBhvr>
                                     </p:animEffect>
@@ -8680,16 +8489,14 @@
       </p:par>
     </p:tnLst>
     <p:bldLst>
-      <p:bldP spid="12" grpId="0" animBg="1"/>
-      <p:bldP spid="13" grpId="0" animBg="1"/>
       <p:bldP spid="14" grpId="0" animBg="1"/>
       <p:bldP spid="15" grpId="0" animBg="1"/>
       <p:bldP spid="18" grpId="0" animBg="1"/>
       <p:bldP spid="19" grpId="0" animBg="1"/>
       <p:bldP spid="20" grpId="0" animBg="1"/>
       <p:bldP spid="21" grpId="0" animBg="1"/>
-      <p:bldP spid="22" grpId="0" animBg="1"/>
-      <p:bldP spid="23" grpId="0" animBg="1"/>
+      <p:bldP spid="24" grpId="0" animBg="1"/>
+      <p:bldP spid="25" grpId="0" animBg="1"/>
     </p:bldLst>
   </p:timing>
 </p:sld>
@@ -8853,10 +8660,9 @@
           <a:p>
             <a:pPr algn="ctr"/>
             <a:r>
-              <a:rPr lang="en-US" dirty="0" err="1"/>
+              <a:rPr lang="en-US" dirty="0"/>
               <a:t>Aplicação</a:t>
             </a:r>
-            <a:endParaRPr lang="en-US" dirty="0"/>
           </a:p>
         </p:txBody>
       </p:sp>
@@ -14801,7 +14607,7 @@
 <file path=ppt/theme/theme1.xml><?xml version="1.0" encoding="utf-8"?>
 <a:theme xmlns:a="http://schemas.openxmlformats.org/drawingml/2006/main" name="Retrospectiva">
   <a:themeElements>
-    <a:clrScheme name="Retrospectiva">
+    <a:clrScheme name="veronez.dev">
       <a:dk1>
         <a:srgbClr val="000000"/>
       </a:dk1>
@@ -14815,13 +14621,13 @@
         <a:srgbClr val="CCDDEA"/>
       </a:lt2>
       <a:accent1>
-        <a:srgbClr val="E48312"/>
+        <a:srgbClr val="6F7577"/>
       </a:accent1>
       <a:accent2>
-        <a:srgbClr val="BD582C"/>
+        <a:srgbClr val="186A78"/>
       </a:accent2>
       <a:accent3>
-        <a:srgbClr val="865640"/>
+        <a:srgbClr val="3489A3"/>
       </a:accent3>
       <a:accent4>
         <a:srgbClr val="9B8357"/>

</xml_diff>